<commit_message>
added diagram for iteration algorithms.
</commit_message>
<xml_diff>
--- a/slides/22_Reinforcement_Learning.pptx
+++ b/slides/22_Reinforcement_Learning.pptx
@@ -5654,8 +5654,8 @@
         </p:blipFill>
         <p:spPr>
           <a:xfrm>
-            <a:off x="1524000" y="2169765"/>
-            <a:ext cx="8521370" cy="4191001"/>
+            <a:off x="1049729" y="2117253"/>
+            <a:ext cx="8130101" cy="3998566"/>
           </a:xfrm>
           <a:prstGeom prst="rect">
             <a:avLst/>
@@ -5676,8 +5676,8 @@
         </p:nvSpPr>
         <p:spPr>
           <a:xfrm>
-            <a:off x="1371600" y="2133600"/>
-            <a:ext cx="8763000" cy="4267200"/>
+            <a:off x="990600" y="2133600"/>
+            <a:ext cx="8001000" cy="3998566"/>
           </a:xfrm>
           <a:prstGeom prst="rect">
             <a:avLst/>
@@ -5852,7 +5852,7 @@
         </p:nvSpPr>
         <p:spPr>
           <a:xfrm>
-            <a:off x="8098277" y="4760566"/>
+            <a:off x="7315200" y="4530308"/>
             <a:ext cx="2667000" cy="685801"/>
           </a:xfrm>
           <a:prstGeom prst="wedgeRoundRectCallout">
@@ -5892,8 +5892,8 @@
           </a:p>
         </p:txBody>
       </p:sp>
-      <mc:AlternateContent xmlns:mc="http://schemas.openxmlformats.org/markup-compatibility/2006" xmlns:a14="http://schemas.microsoft.com/office/drawing/2010/main">
-        <mc:Choice Requires="a14">
+      <mc:AlternateContent xmlns:mc="http://schemas.openxmlformats.org/markup-compatibility/2006">
+        <mc:Choice xmlns:a14="http://schemas.microsoft.com/office/drawing/2010/main" Requires="a14">
           <p:sp>
             <p:nvSpPr>
               <p:cNvPr id="7" name="TextBox 6">
@@ -5908,7 +5908,7 @@
             </p:nvSpPr>
             <p:spPr>
               <a:xfrm>
-                <a:off x="8821043" y="5976041"/>
+                <a:off x="7711214" y="5858196"/>
                 <a:ext cx="2474716" cy="729559"/>
               </a:xfrm>
               <a:prstGeom prst="rect">
@@ -6045,7 +6045,7 @@
             </p:txBody>
           </p:sp>
         </mc:Choice>
-        <mc:Fallback xmlns="">
+        <mc:Fallback>
           <p:sp>
             <p:nvSpPr>
               <p:cNvPr id="7" name="TextBox 6">
@@ -6062,7 +6062,7 @@
             </p:nvSpPr>
             <p:spPr>
               <a:xfrm>
-                <a:off x="8821043" y="5976041"/>
+                <a:off x="7711214" y="5858196"/>
                 <a:ext cx="2474716" cy="729559"/>
               </a:xfrm>
               <a:prstGeom prst="rect">
@@ -6071,7 +6071,7 @@
               <a:blipFill>
                 <a:blip r:embed="rId4"/>
                 <a:stretch>
-                  <a:fillRect l="-1716" b="-13115"/>
+                  <a:fillRect l="-1716" t="-820" b="-13115"/>
                 </a:stretch>
               </a:blipFill>
             </p:spPr>
@@ -6090,8 +6090,8 @@
           </p:sp>
         </mc:Fallback>
       </mc:AlternateContent>
-      <mc:AlternateContent xmlns:mc="http://schemas.openxmlformats.org/markup-compatibility/2006" xmlns:a14="http://schemas.microsoft.com/office/drawing/2010/main">
-        <mc:Choice Requires="a14">
+      <mc:AlternateContent xmlns:mc="http://schemas.openxmlformats.org/markup-compatibility/2006">
+        <mc:Choice xmlns:a14="http://schemas.microsoft.com/office/drawing/2010/main" Requires="a14">
           <p:sp>
             <p:nvSpPr>
               <p:cNvPr id="13" name="TextBox 12">
@@ -6135,24 +6135,6 @@
                         <a:latin typeface="Cambria Math" panose="02040503050406030204" pitchFamily="18" charset="0"/>
                       </a:rPr>
                       <m:t>𝑈</m:t>
-                    </m:r>
-                    <m:r>
-                      <a:rPr lang="en-US" i="1" dirty="0" smtClean="0">
-                        <a:latin typeface="Cambria Math" panose="02040503050406030204" pitchFamily="18" charset="0"/>
-                      </a:rPr>
-                      <m:t>(</m:t>
-                    </m:r>
-                    <m:r>
-                      <a:rPr lang="en-US" i="1" dirty="0" smtClean="0">
-                        <a:latin typeface="Cambria Math" panose="02040503050406030204" pitchFamily="18" charset="0"/>
-                      </a:rPr>
-                      <m:t>𝑠</m:t>
-                    </m:r>
-                    <m:r>
-                      <a:rPr lang="en-US" i="1" dirty="0" smtClean="0">
-                        <a:latin typeface="Cambria Math" panose="02040503050406030204" pitchFamily="18" charset="0"/>
-                      </a:rPr>
-                      <m:t>)</m:t>
                     </m:r>
                   </m:oMath>
                 </a14:m>
@@ -6219,7 +6201,7 @@
             </p:txBody>
           </p:sp>
         </mc:Choice>
-        <mc:Fallback xmlns="">
+        <mc:Fallback>
           <p:sp>
             <p:nvSpPr>
               <p:cNvPr id="13" name="TextBox 12">
@@ -6245,7 +6227,7 @@
               <a:blipFill>
                 <a:blip r:embed="rId5"/>
                 <a:stretch>
-                  <a:fillRect l="-529" t="-3268" r="-176"/>
+                  <a:fillRect l="-529" t="-3268"/>
                 </a:stretch>
               </a:blipFill>
             </p:spPr>
@@ -6264,8 +6246,8 @@
           </p:sp>
         </mc:Fallback>
       </mc:AlternateContent>
-      <mc:AlternateContent xmlns:mc="http://schemas.openxmlformats.org/markup-compatibility/2006" xmlns:a14="http://schemas.microsoft.com/office/drawing/2010/main">
-        <mc:Choice Requires="a14">
+      <mc:AlternateContent xmlns:mc="http://schemas.openxmlformats.org/markup-compatibility/2006">
+        <mc:Choice xmlns:a14="http://schemas.microsoft.com/office/drawing/2010/main" Requires="a14">
           <p:sp>
             <p:nvSpPr>
               <p:cNvPr id="14" name="Speech Bubble: Rectangle with Corners Rounded 13">
@@ -6280,7 +6262,7 @@
             </p:nvSpPr>
             <p:spPr>
               <a:xfrm>
-                <a:off x="4267200" y="6019800"/>
+                <a:off x="3505200" y="5805612"/>
                 <a:ext cx="3810000" cy="685801"/>
               </a:xfrm>
               <a:prstGeom prst="wedgeRoundRectCallout">
@@ -6397,7 +6379,7 @@
             </p:txBody>
           </p:sp>
         </mc:Choice>
-        <mc:Fallback xmlns="">
+        <mc:Fallback>
           <p:sp>
             <p:nvSpPr>
               <p:cNvPr id="14" name="Speech Bubble: Rectangle with Corners Rounded 13">
@@ -6414,7 +6396,7 @@
             </p:nvSpPr>
             <p:spPr>
               <a:xfrm>
-                <a:off x="4267200" y="6019800"/>
+                <a:off x="3505200" y="5805612"/>
                 <a:ext cx="3810000" cy="685801"/>
               </a:xfrm>
               <a:prstGeom prst="wedgeRoundRectCallout">
@@ -6427,7 +6409,847 @@
               <a:blipFill>
                 <a:blip r:embed="rId6"/>
                 <a:stretch>
-                  <a:fillRect t="-877" b="-9649"/>
+                  <a:fillRect b="-9565"/>
+                </a:stretch>
+              </a:blipFill>
+            </p:spPr>
+            <p:txBody>
+              <a:bodyPr/>
+              <a:lstStyle/>
+              <a:p>
+                <a:r>
+                  <a:rPr lang="en-US">
+                    <a:noFill/>
+                  </a:rPr>
+                  <a:t> </a:t>
+                </a:r>
+              </a:p>
+            </p:txBody>
+          </p:sp>
+        </mc:Fallback>
+      </mc:AlternateContent>
+      <p:cxnSp>
+        <p:nvCxnSpPr>
+          <p:cNvPr id="4" name="Straight Connector 3">
+            <a:extLst>
+              <a:ext uri="{FF2B5EF4-FFF2-40B4-BE49-F238E27FC236}">
+                <a16:creationId xmlns:a16="http://schemas.microsoft.com/office/drawing/2014/main" id="{53024366-3B9C-8541-0D28-708BBC7AE6C7}"/>
+              </a:ext>
+            </a:extLst>
+          </p:cNvPr>
+          <p:cNvCxnSpPr>
+            <a:cxnSpLocks/>
+          </p:cNvCxnSpPr>
+          <p:nvPr/>
+        </p:nvCxnSpPr>
+        <p:spPr>
+          <a:xfrm>
+            <a:off x="9337182" y="3124199"/>
+            <a:ext cx="2393078" cy="0"/>
+          </a:xfrm>
+          <a:prstGeom prst="line">
+            <a:avLst/>
+          </a:prstGeom>
+        </p:spPr>
+        <p:style>
+          <a:lnRef idx="1">
+            <a:schemeClr val="accent1"/>
+          </a:lnRef>
+          <a:fillRef idx="0">
+            <a:schemeClr val="accent1"/>
+          </a:fillRef>
+          <a:effectRef idx="0">
+            <a:schemeClr val="accent1"/>
+          </a:effectRef>
+          <a:fontRef idx="minor">
+            <a:schemeClr val="tx1"/>
+          </a:fontRef>
+        </p:style>
+      </p:cxnSp>
+      <mc:AlternateContent xmlns:mc="http://schemas.openxmlformats.org/markup-compatibility/2006">
+        <mc:Choice xmlns:a14="http://schemas.microsoft.com/office/drawing/2010/main" Requires="a14">
+          <p:sp>
+            <p:nvSpPr>
+              <p:cNvPr id="9" name="TextBox 8">
+                <a:extLst>
+                  <a:ext uri="{FF2B5EF4-FFF2-40B4-BE49-F238E27FC236}">
+                    <a16:creationId xmlns:a16="http://schemas.microsoft.com/office/drawing/2014/main" id="{115AA05C-2180-0AF6-A384-9D75BED15ED1}"/>
+                  </a:ext>
+                </a:extLst>
+              </p:cNvPr>
+              <p:cNvSpPr txBox="1"/>
+              <p:nvPr/>
+            </p:nvSpPr>
+            <p:spPr>
+              <a:xfrm>
+                <a:off x="11425004" y="3092683"/>
+                <a:ext cx="766996" cy="388568"/>
+              </a:xfrm>
+              <a:prstGeom prst="rect">
+                <a:avLst/>
+              </a:prstGeom>
+              <a:noFill/>
+            </p:spPr>
+            <p:txBody>
+              <a:bodyPr wrap="square">
+                <a:spAutoFit/>
+              </a:bodyPr>
+              <a:lstStyle/>
+              <a:p>
+                <a:pPr/>
+                <a14:m>
+                  <m:oMathPara xmlns:m="http://schemas.openxmlformats.org/officeDocument/2006/math">
+                    <m:oMathParaPr>
+                      <m:jc m:val="centerGroup"/>
+                    </m:oMathParaPr>
+                    <m:oMath xmlns:m="http://schemas.openxmlformats.org/officeDocument/2006/math">
+                      <m:sSup>
+                        <m:sSupPr>
+                          <m:ctrlPr>
+                            <a:rPr lang="en-US" sz="1800" i="1" smtClean="0">
+                              <a:latin typeface="Cambria Math" panose="02040503050406030204" pitchFamily="18" charset="0"/>
+                            </a:rPr>
+                          </m:ctrlPr>
+                        </m:sSupPr>
+                        <m:e>
+                          <m:r>
+                            <a:rPr lang="en-US" sz="1800" i="1">
+                              <a:latin typeface="Cambria Math" panose="02040503050406030204" pitchFamily="18" charset="0"/>
+                            </a:rPr>
+                            <m:t>𝑈</m:t>
+                          </m:r>
+                        </m:e>
+                        <m:sup>
+                          <m:sSup>
+                            <m:sSupPr>
+                              <m:ctrlPr>
+                                <a:rPr lang="en-US" sz="1800" i="1">
+                                  <a:latin typeface="Cambria Math" panose="02040503050406030204" pitchFamily="18" charset="0"/>
+                                </a:rPr>
+                              </m:ctrlPr>
+                            </m:sSupPr>
+                            <m:e>
+                              <m:r>
+                                <a:rPr lang="en-US" sz="1800" i="1">
+                                  <a:latin typeface="Cambria Math" panose="02040503050406030204" pitchFamily="18" charset="0"/>
+                                </a:rPr>
+                                <m:t>𝜋</m:t>
+                              </m:r>
+                            </m:e>
+                            <m:sup>
+                              <m:r>
+                                <a:rPr lang="en-US" sz="1800" i="1">
+                                  <a:latin typeface="Cambria Math" panose="02040503050406030204" pitchFamily="18" charset="0"/>
+                                </a:rPr>
+                                <m:t>∗</m:t>
+                              </m:r>
+                            </m:sup>
+                          </m:sSup>
+                        </m:sup>
+                      </m:sSup>
+                    </m:oMath>
+                  </m:oMathPara>
+                </a14:m>
+                <a:endParaRPr lang="en-US" dirty="0"/>
+              </a:p>
+            </p:txBody>
+          </p:sp>
+        </mc:Choice>
+        <mc:Fallback>
+          <p:sp>
+            <p:nvSpPr>
+              <p:cNvPr id="9" name="TextBox 8">
+                <a:extLst>
+                  <a:ext uri="{FF2B5EF4-FFF2-40B4-BE49-F238E27FC236}">
+                    <a16:creationId xmlns:a16="http://schemas.microsoft.com/office/drawing/2014/main" id="{115AA05C-2180-0AF6-A384-9D75BED15ED1}"/>
+                  </a:ext>
+                </a:extLst>
+              </p:cNvPr>
+              <p:cNvSpPr txBox="1">
+                <a:spLocks noRot="1" noChangeAspect="1" noMove="1" noResize="1" noEditPoints="1" noAdjustHandles="1" noChangeArrowheads="1" noChangeShapeType="1" noTextEdit="1"/>
+              </p:cNvSpPr>
+              <p:nvPr/>
+            </p:nvSpPr>
+            <p:spPr>
+              <a:xfrm>
+                <a:off x="11425004" y="3092683"/>
+                <a:ext cx="766996" cy="388568"/>
+              </a:xfrm>
+              <a:prstGeom prst="rect">
+                <a:avLst/>
+              </a:prstGeom>
+              <a:blipFill>
+                <a:blip r:embed="rId7"/>
+                <a:stretch>
+                  <a:fillRect/>
+                </a:stretch>
+              </a:blipFill>
+            </p:spPr>
+            <p:txBody>
+              <a:bodyPr/>
+              <a:lstStyle/>
+              <a:p>
+                <a:r>
+                  <a:rPr lang="en-US">
+                    <a:noFill/>
+                  </a:rPr>
+                  <a:t> </a:t>
+                </a:r>
+              </a:p>
+            </p:txBody>
+          </p:sp>
+        </mc:Fallback>
+      </mc:AlternateContent>
+      <p:sp>
+        <p:nvSpPr>
+          <p:cNvPr id="25" name="Arc 24">
+            <a:extLst>
+              <a:ext uri="{FF2B5EF4-FFF2-40B4-BE49-F238E27FC236}">
+                <a16:creationId xmlns:a16="http://schemas.microsoft.com/office/drawing/2014/main" id="{830A3C56-435D-BEBE-B83F-3BA9F9E0169B}"/>
+              </a:ext>
+            </a:extLst>
+          </p:cNvPr>
+          <p:cNvSpPr/>
+          <p:nvPr/>
+        </p:nvSpPr>
+        <p:spPr>
+          <a:xfrm>
+            <a:off x="9760371" y="2649297"/>
+            <a:ext cx="574339" cy="1009376"/>
+          </a:xfrm>
+          <a:prstGeom prst="arc">
+            <a:avLst>
+              <a:gd name="adj1" fmla="val 10871568"/>
+              <a:gd name="adj2" fmla="val 0"/>
+            </a:avLst>
+          </a:prstGeom>
+          <a:ln w="19050" cap="flat" cmpd="sng" algn="ctr">
+            <a:solidFill>
+              <a:schemeClr val="accent6"/>
+            </a:solidFill>
+            <a:prstDash val="solid"/>
+            <a:round/>
+            <a:headEnd type="none" w="med" len="med"/>
+            <a:tailEnd type="arrow" w="med" len="med"/>
+          </a:ln>
+        </p:spPr>
+        <p:style>
+          <a:lnRef idx="0">
+            <a:scrgbClr r="0" g="0" b="0"/>
+          </a:lnRef>
+          <a:fillRef idx="0">
+            <a:scrgbClr r="0" g="0" b="0"/>
+          </a:fillRef>
+          <a:effectRef idx="0">
+            <a:scrgbClr r="0" g="0" b="0"/>
+          </a:effectRef>
+          <a:fontRef idx="minor">
+            <a:schemeClr val="tx1"/>
+          </a:fontRef>
+        </p:style>
+        <p:txBody>
+          <a:bodyPr rtlCol="0" anchor="ctr"/>
+          <a:lstStyle/>
+          <a:p>
+            <a:pPr algn="ctr"/>
+            <a:endParaRPr lang="en-US"/>
+          </a:p>
+        </p:txBody>
+      </p:sp>
+      <p:sp>
+        <p:nvSpPr>
+          <p:cNvPr id="26" name="Arc 25">
+            <a:extLst>
+              <a:ext uri="{FF2B5EF4-FFF2-40B4-BE49-F238E27FC236}">
+                <a16:creationId xmlns:a16="http://schemas.microsoft.com/office/drawing/2014/main" id="{3FB9398F-7C22-1F4D-9C1A-D846D19FEED3}"/>
+              </a:ext>
+            </a:extLst>
+          </p:cNvPr>
+          <p:cNvSpPr/>
+          <p:nvPr/>
+        </p:nvSpPr>
+        <p:spPr>
+          <a:xfrm>
+            <a:off x="10334710" y="2614308"/>
+            <a:ext cx="765785" cy="1019782"/>
+          </a:xfrm>
+          <a:prstGeom prst="arc">
+            <a:avLst>
+              <a:gd name="adj1" fmla="val 10871568"/>
+              <a:gd name="adj2" fmla="val 0"/>
+            </a:avLst>
+          </a:prstGeom>
+          <a:ln w="19050" cap="flat" cmpd="sng" algn="ctr">
+            <a:solidFill>
+              <a:schemeClr val="accent6"/>
+            </a:solidFill>
+            <a:prstDash val="solid"/>
+            <a:round/>
+            <a:headEnd type="none" w="med" len="med"/>
+            <a:tailEnd type="arrow" w="med" len="med"/>
+          </a:ln>
+        </p:spPr>
+        <p:style>
+          <a:lnRef idx="0">
+            <a:scrgbClr r="0" g="0" b="0"/>
+          </a:lnRef>
+          <a:fillRef idx="0">
+            <a:scrgbClr r="0" g="0" b="0"/>
+          </a:fillRef>
+          <a:effectRef idx="0">
+            <a:scrgbClr r="0" g="0" b="0"/>
+          </a:effectRef>
+          <a:fontRef idx="minor">
+            <a:schemeClr val="tx1"/>
+          </a:fontRef>
+        </p:style>
+        <p:txBody>
+          <a:bodyPr rtlCol="0" anchor="ctr"/>
+          <a:lstStyle/>
+          <a:p>
+            <a:pPr algn="ctr"/>
+            <a:endParaRPr lang="en-US"/>
+          </a:p>
+        </p:txBody>
+      </p:sp>
+      <p:sp>
+        <p:nvSpPr>
+          <p:cNvPr id="27" name="Arc 26">
+            <a:extLst>
+              <a:ext uri="{FF2B5EF4-FFF2-40B4-BE49-F238E27FC236}">
+                <a16:creationId xmlns:a16="http://schemas.microsoft.com/office/drawing/2014/main" id="{72229F87-12B2-362D-80BC-031A6CAAE42F}"/>
+              </a:ext>
+            </a:extLst>
+          </p:cNvPr>
+          <p:cNvSpPr/>
+          <p:nvPr/>
+        </p:nvSpPr>
+        <p:spPr>
+          <a:xfrm>
+            <a:off x="11100495" y="2627412"/>
+            <a:ext cx="220048" cy="1019782"/>
+          </a:xfrm>
+          <a:prstGeom prst="arc">
+            <a:avLst>
+              <a:gd name="adj1" fmla="val 10871568"/>
+              <a:gd name="adj2" fmla="val 0"/>
+            </a:avLst>
+          </a:prstGeom>
+          <a:ln w="19050" cap="flat" cmpd="sng" algn="ctr">
+            <a:solidFill>
+              <a:schemeClr val="accent6"/>
+            </a:solidFill>
+            <a:prstDash val="solid"/>
+            <a:round/>
+            <a:headEnd type="none" w="med" len="med"/>
+            <a:tailEnd type="arrow" w="med" len="med"/>
+          </a:ln>
+        </p:spPr>
+        <p:style>
+          <a:lnRef idx="0">
+            <a:scrgbClr r="0" g="0" b="0"/>
+          </a:lnRef>
+          <a:fillRef idx="0">
+            <a:scrgbClr r="0" g="0" b="0"/>
+          </a:fillRef>
+          <a:effectRef idx="0">
+            <a:scrgbClr r="0" g="0" b="0"/>
+          </a:effectRef>
+          <a:fontRef idx="minor">
+            <a:schemeClr val="tx1"/>
+          </a:fontRef>
+        </p:style>
+        <p:txBody>
+          <a:bodyPr rtlCol="0" anchor="ctr"/>
+          <a:lstStyle/>
+          <a:p>
+            <a:pPr algn="ctr"/>
+            <a:endParaRPr lang="en-US"/>
+          </a:p>
+        </p:txBody>
+      </p:sp>
+      <p:sp>
+        <p:nvSpPr>
+          <p:cNvPr id="28" name="Arc 27">
+            <a:extLst>
+              <a:ext uri="{FF2B5EF4-FFF2-40B4-BE49-F238E27FC236}">
+                <a16:creationId xmlns:a16="http://schemas.microsoft.com/office/drawing/2014/main" id="{936EFA66-6C09-679B-C4C9-F361F262C3E0}"/>
+              </a:ext>
+            </a:extLst>
+          </p:cNvPr>
+          <p:cNvSpPr/>
+          <p:nvPr/>
+        </p:nvSpPr>
+        <p:spPr>
+          <a:xfrm>
+            <a:off x="11308888" y="2648522"/>
+            <a:ext cx="417487" cy="951353"/>
+          </a:xfrm>
+          <a:prstGeom prst="arc">
+            <a:avLst>
+              <a:gd name="adj1" fmla="val 10871568"/>
+              <a:gd name="adj2" fmla="val 0"/>
+            </a:avLst>
+          </a:prstGeom>
+          <a:ln w="19050" cap="flat" cmpd="sng" algn="ctr">
+            <a:solidFill>
+              <a:schemeClr val="accent6"/>
+            </a:solidFill>
+            <a:prstDash val="solid"/>
+            <a:round/>
+            <a:headEnd type="none" w="med" len="med"/>
+            <a:tailEnd type="arrow" w="med" len="med"/>
+          </a:ln>
+        </p:spPr>
+        <p:style>
+          <a:lnRef idx="0">
+            <a:scrgbClr r="0" g="0" b="0"/>
+          </a:lnRef>
+          <a:fillRef idx="0">
+            <a:scrgbClr r="0" g="0" b="0"/>
+          </a:fillRef>
+          <a:effectRef idx="0">
+            <a:scrgbClr r="0" g="0" b="0"/>
+          </a:effectRef>
+          <a:fontRef idx="minor">
+            <a:schemeClr val="tx1"/>
+          </a:fontRef>
+        </p:style>
+        <p:txBody>
+          <a:bodyPr rtlCol="0" anchor="ctr"/>
+          <a:lstStyle/>
+          <a:p>
+            <a:pPr algn="ctr"/>
+            <a:endParaRPr lang="en-US"/>
+          </a:p>
+        </p:txBody>
+      </p:sp>
+      <mc:AlternateContent xmlns:mc="http://schemas.openxmlformats.org/markup-compatibility/2006">
+        <mc:Choice xmlns:a14="http://schemas.microsoft.com/office/drawing/2010/main" Requires="a14">
+          <p:sp>
+            <p:nvSpPr>
+              <p:cNvPr id="30" name="TextBox 29">
+                <a:extLst>
+                  <a:ext uri="{FF2B5EF4-FFF2-40B4-BE49-F238E27FC236}">
+                    <a16:creationId xmlns:a16="http://schemas.microsoft.com/office/drawing/2014/main" id="{6DB673C8-2425-685A-8CBE-35EDDCA1EB91}"/>
+                  </a:ext>
+                </a:extLst>
+              </p:cNvPr>
+              <p:cNvSpPr txBox="1"/>
+              <p:nvPr/>
+            </p:nvSpPr>
+            <p:spPr>
+              <a:xfrm>
+                <a:off x="9564903" y="3086337"/>
+                <a:ext cx="395810" cy="369332"/>
+              </a:xfrm>
+              <a:prstGeom prst="rect">
+                <a:avLst/>
+              </a:prstGeom>
+              <a:noFill/>
+            </p:spPr>
+            <p:txBody>
+              <a:bodyPr wrap="square">
+                <a:spAutoFit/>
+              </a:bodyPr>
+              <a:lstStyle/>
+              <a:p>
+                <a:pPr/>
+                <a14:m>
+                  <m:oMathPara xmlns:m="http://schemas.openxmlformats.org/officeDocument/2006/math">
+                    <m:oMathParaPr>
+                      <m:jc m:val="centerGroup"/>
+                    </m:oMathParaPr>
+                    <m:oMath xmlns:m="http://schemas.openxmlformats.org/officeDocument/2006/math">
+                      <m:r>
+                        <a:rPr lang="en-US" sz="1800" b="0" i="1" smtClean="0">
+                          <a:latin typeface="Cambria Math" panose="02040503050406030204" pitchFamily="18" charset="0"/>
+                        </a:rPr>
+                        <m:t>𝑈</m:t>
+                      </m:r>
+                    </m:oMath>
+                  </m:oMathPara>
+                </a14:m>
+                <a:endParaRPr lang="en-US" dirty="0"/>
+              </a:p>
+            </p:txBody>
+          </p:sp>
+        </mc:Choice>
+        <mc:Fallback>
+          <p:sp>
+            <p:nvSpPr>
+              <p:cNvPr id="30" name="TextBox 29">
+                <a:extLst>
+                  <a:ext uri="{FF2B5EF4-FFF2-40B4-BE49-F238E27FC236}">
+                    <a16:creationId xmlns:a16="http://schemas.microsoft.com/office/drawing/2014/main" id="{6DB673C8-2425-685A-8CBE-35EDDCA1EB91}"/>
+                  </a:ext>
+                </a:extLst>
+              </p:cNvPr>
+              <p:cNvSpPr txBox="1">
+                <a:spLocks noRot="1" noChangeAspect="1" noMove="1" noResize="1" noEditPoints="1" noAdjustHandles="1" noChangeArrowheads="1" noChangeShapeType="1" noTextEdit="1"/>
+              </p:cNvSpPr>
+              <p:nvPr/>
+            </p:nvSpPr>
+            <p:spPr>
+              <a:xfrm>
+                <a:off x="9564903" y="3086337"/>
+                <a:ext cx="395810" cy="369332"/>
+              </a:xfrm>
+              <a:prstGeom prst="rect">
+                <a:avLst/>
+              </a:prstGeom>
+              <a:blipFill>
+                <a:blip r:embed="rId8"/>
+                <a:stretch>
+                  <a:fillRect/>
+                </a:stretch>
+              </a:blipFill>
+            </p:spPr>
+            <p:txBody>
+              <a:bodyPr/>
+              <a:lstStyle/>
+              <a:p>
+                <a:r>
+                  <a:rPr lang="en-US">
+                    <a:noFill/>
+                  </a:rPr>
+                  <a:t> </a:t>
+                </a:r>
+              </a:p>
+            </p:txBody>
+          </p:sp>
+        </mc:Fallback>
+      </mc:AlternateContent>
+      <mc:AlternateContent xmlns:mc="http://schemas.openxmlformats.org/markup-compatibility/2006">
+        <mc:Choice xmlns:a14="http://schemas.microsoft.com/office/drawing/2010/main" Requires="a14">
+          <p:sp>
+            <p:nvSpPr>
+              <p:cNvPr id="31" name="TextBox 30">
+                <a:extLst>
+                  <a:ext uri="{FF2B5EF4-FFF2-40B4-BE49-F238E27FC236}">
+                    <a16:creationId xmlns:a16="http://schemas.microsoft.com/office/drawing/2014/main" id="{56DA2FE2-AC26-7B66-B5BD-7064ECD50CE7}"/>
+                  </a:ext>
+                </a:extLst>
+              </p:cNvPr>
+              <p:cNvSpPr txBox="1"/>
+              <p:nvPr/>
+            </p:nvSpPr>
+            <p:spPr>
+              <a:xfrm>
+                <a:off x="10066895" y="3115740"/>
+                <a:ext cx="395810" cy="369332"/>
+              </a:xfrm>
+              <a:prstGeom prst="rect">
+                <a:avLst/>
+              </a:prstGeom>
+              <a:noFill/>
+            </p:spPr>
+            <p:txBody>
+              <a:bodyPr wrap="square">
+                <a:spAutoFit/>
+              </a:bodyPr>
+              <a:lstStyle/>
+              <a:p>
+                <a:pPr/>
+                <a14:m>
+                  <m:oMathPara xmlns:m="http://schemas.openxmlformats.org/officeDocument/2006/math">
+                    <m:oMathParaPr>
+                      <m:jc m:val="centerGroup"/>
+                    </m:oMathParaPr>
+                    <m:oMath xmlns:m="http://schemas.openxmlformats.org/officeDocument/2006/math">
+                      <m:r>
+                        <a:rPr lang="en-US" sz="1800" b="0" i="1" smtClean="0">
+                          <a:latin typeface="Cambria Math" panose="02040503050406030204" pitchFamily="18" charset="0"/>
+                        </a:rPr>
+                        <m:t>𝑈</m:t>
+                      </m:r>
+                      <m:r>
+                        <a:rPr lang="en-US" sz="1800" b="0" i="1" smtClean="0">
+                          <a:latin typeface="Cambria Math" panose="02040503050406030204" pitchFamily="18" charset="0"/>
+                        </a:rPr>
+                        <m:t>′</m:t>
+                      </m:r>
+                    </m:oMath>
+                  </m:oMathPara>
+                </a14:m>
+                <a:endParaRPr lang="en-US" dirty="0"/>
+              </a:p>
+            </p:txBody>
+          </p:sp>
+        </mc:Choice>
+        <mc:Fallback>
+          <p:sp>
+            <p:nvSpPr>
+              <p:cNvPr id="31" name="TextBox 30">
+                <a:extLst>
+                  <a:ext uri="{FF2B5EF4-FFF2-40B4-BE49-F238E27FC236}">
+                    <a16:creationId xmlns:a16="http://schemas.microsoft.com/office/drawing/2014/main" id="{56DA2FE2-AC26-7B66-B5BD-7064ECD50CE7}"/>
+                  </a:ext>
+                </a:extLst>
+              </p:cNvPr>
+              <p:cNvSpPr txBox="1">
+                <a:spLocks noRot="1" noChangeAspect="1" noMove="1" noResize="1" noEditPoints="1" noAdjustHandles="1" noChangeArrowheads="1" noChangeShapeType="1" noTextEdit="1"/>
+              </p:cNvSpPr>
+              <p:nvPr/>
+            </p:nvSpPr>
+            <p:spPr>
+              <a:xfrm>
+                <a:off x="10066895" y="3115740"/>
+                <a:ext cx="395810" cy="369332"/>
+              </a:xfrm>
+              <a:prstGeom prst="rect">
+                <a:avLst/>
+              </a:prstGeom>
+              <a:blipFill>
+                <a:blip r:embed="rId9"/>
+                <a:stretch>
+                  <a:fillRect r="-1538"/>
+                </a:stretch>
+              </a:blipFill>
+            </p:spPr>
+            <p:txBody>
+              <a:bodyPr/>
+              <a:lstStyle/>
+              <a:p>
+                <a:r>
+                  <a:rPr lang="en-US">
+                    <a:noFill/>
+                  </a:rPr>
+                  <a:t> </a:t>
+                </a:r>
+              </a:p>
+            </p:txBody>
+          </p:sp>
+        </mc:Fallback>
+      </mc:AlternateContent>
+      <p:sp>
+        <p:nvSpPr>
+          <p:cNvPr id="34" name="Oval 33">
+            <a:extLst>
+              <a:ext uri="{FF2B5EF4-FFF2-40B4-BE49-F238E27FC236}">
+                <a16:creationId xmlns:a16="http://schemas.microsoft.com/office/drawing/2014/main" id="{4AF4F629-36FB-BF7C-2361-1AFA669F5F24}"/>
+              </a:ext>
+            </a:extLst>
+          </p:cNvPr>
+          <p:cNvSpPr/>
+          <p:nvPr/>
+        </p:nvSpPr>
+        <p:spPr>
+          <a:xfrm>
+            <a:off x="11680507" y="3066584"/>
+            <a:ext cx="127995" cy="117892"/>
+          </a:xfrm>
+          <a:prstGeom prst="ellipse">
+            <a:avLst/>
+          </a:prstGeom>
+        </p:spPr>
+        <p:style>
+          <a:lnRef idx="2">
+            <a:schemeClr val="accent6">
+              <a:shade val="15000"/>
+            </a:schemeClr>
+          </a:lnRef>
+          <a:fillRef idx="1">
+            <a:schemeClr val="accent6"/>
+          </a:fillRef>
+          <a:effectRef idx="0">
+            <a:schemeClr val="accent6"/>
+          </a:effectRef>
+          <a:fontRef idx="minor">
+            <a:schemeClr val="lt1"/>
+          </a:fontRef>
+        </p:style>
+        <p:txBody>
+          <a:bodyPr rtlCol="0" anchor="ctr"/>
+          <a:lstStyle/>
+          <a:p>
+            <a:pPr algn="ctr"/>
+            <a:endParaRPr lang="en-US"/>
+          </a:p>
+        </p:txBody>
+      </p:sp>
+      <p:sp>
+        <p:nvSpPr>
+          <p:cNvPr id="36" name="TextBox 35">
+            <a:extLst>
+              <a:ext uri="{FF2B5EF4-FFF2-40B4-BE49-F238E27FC236}">
+                <a16:creationId xmlns:a16="http://schemas.microsoft.com/office/drawing/2014/main" id="{0C0182D5-6E45-5881-FEB0-C4755A1551A6}"/>
+              </a:ext>
+            </a:extLst>
+          </p:cNvPr>
+          <p:cNvSpPr txBox="1"/>
+          <p:nvPr/>
+        </p:nvSpPr>
+        <p:spPr>
+          <a:xfrm>
+            <a:off x="9508665" y="2296800"/>
+            <a:ext cx="1354529" cy="278747"/>
+          </a:xfrm>
+          <a:prstGeom prst="rect">
+            <a:avLst/>
+          </a:prstGeom>
+          <a:noFill/>
+        </p:spPr>
+        <p:txBody>
+          <a:bodyPr wrap="square">
+            <a:spAutoFit/>
+          </a:bodyPr>
+          <a:lstStyle/>
+          <a:p>
+            <a:r>
+              <a:rPr lang="en-US" sz="1200" dirty="0"/>
+              <a:t>Bellman update</a:t>
+            </a:r>
+          </a:p>
+        </p:txBody>
+      </p:sp>
+      <p:sp>
+        <p:nvSpPr>
+          <p:cNvPr id="37" name="Arrow: Down 36">
+            <a:extLst>
+              <a:ext uri="{FF2B5EF4-FFF2-40B4-BE49-F238E27FC236}">
+                <a16:creationId xmlns:a16="http://schemas.microsoft.com/office/drawing/2014/main" id="{489C2DDD-1EBF-335C-9781-0FE90D3CF19A}"/>
+              </a:ext>
+            </a:extLst>
+          </p:cNvPr>
+          <p:cNvSpPr/>
+          <p:nvPr/>
+        </p:nvSpPr>
+        <p:spPr>
+          <a:xfrm>
+            <a:off x="11582400" y="3481251"/>
+            <a:ext cx="248436" cy="388563"/>
+          </a:xfrm>
+          <a:prstGeom prst="downArrow">
+            <a:avLst/>
+          </a:prstGeom>
+        </p:spPr>
+        <p:style>
+          <a:lnRef idx="2">
+            <a:schemeClr val="accent6">
+              <a:shade val="15000"/>
+            </a:schemeClr>
+          </a:lnRef>
+          <a:fillRef idx="1">
+            <a:schemeClr val="accent6"/>
+          </a:fillRef>
+          <a:effectRef idx="0">
+            <a:schemeClr val="accent6"/>
+          </a:effectRef>
+          <a:fontRef idx="minor">
+            <a:schemeClr val="lt1"/>
+          </a:fontRef>
+        </p:style>
+        <p:txBody>
+          <a:bodyPr rtlCol="0" anchor="ctr"/>
+          <a:lstStyle/>
+          <a:p>
+            <a:pPr algn="ctr"/>
+            <a:endParaRPr lang="en-US"/>
+          </a:p>
+        </p:txBody>
+      </p:sp>
+      <mc:AlternateContent xmlns:mc="http://schemas.openxmlformats.org/markup-compatibility/2006">
+        <mc:Choice xmlns:a14="http://schemas.microsoft.com/office/drawing/2010/main" Requires="a14">
+          <p:sp>
+            <p:nvSpPr>
+              <p:cNvPr id="38" name="TextBox 37">
+                <a:extLst>
+                  <a:ext uri="{FF2B5EF4-FFF2-40B4-BE49-F238E27FC236}">
+                    <a16:creationId xmlns:a16="http://schemas.microsoft.com/office/drawing/2014/main" id="{1B940FEA-C9FB-9A35-6062-2E30E7F88345}"/>
+                  </a:ext>
+                </a:extLst>
+              </p:cNvPr>
+              <p:cNvSpPr txBox="1"/>
+              <p:nvPr/>
+            </p:nvSpPr>
+            <p:spPr>
+              <a:xfrm>
+                <a:off x="11100089" y="3830699"/>
+                <a:ext cx="1069780" cy="338554"/>
+              </a:xfrm>
+              <a:prstGeom prst="rect">
+                <a:avLst/>
+              </a:prstGeom>
+              <a:noFill/>
+            </p:spPr>
+            <p:txBody>
+              <a:bodyPr wrap="none" rtlCol="0">
+                <a:spAutoFit/>
+              </a:bodyPr>
+              <a:lstStyle/>
+              <a:p>
+                <a:r>
+                  <a:rPr lang="en-US" sz="1600" dirty="0"/>
+                  <a:t>Extract </a:t>
+                </a:r>
+                <a14:m>
+                  <m:oMath xmlns:m="http://schemas.openxmlformats.org/officeDocument/2006/math">
+                    <m:sSup>
+                      <m:sSupPr>
+                        <m:ctrlPr>
+                          <a:rPr lang="en-US" sz="1600" b="0" i="1" smtClean="0">
+                            <a:latin typeface="Cambria Math" panose="02040503050406030204" pitchFamily="18" charset="0"/>
+                          </a:rPr>
+                        </m:ctrlPr>
+                      </m:sSupPr>
+                      <m:e>
+                        <m:r>
+                          <a:rPr lang="en-US" sz="1600" b="0" i="1" smtClean="0">
+                            <a:latin typeface="Cambria Math" panose="02040503050406030204" pitchFamily="18" charset="0"/>
+                          </a:rPr>
+                          <m:t>𝜋</m:t>
+                        </m:r>
+                      </m:e>
+                      <m:sup>
+                        <m:r>
+                          <a:rPr lang="en-US" sz="1600" b="0" i="1" smtClean="0">
+                            <a:latin typeface="Cambria Math" panose="02040503050406030204" pitchFamily="18" charset="0"/>
+                          </a:rPr>
+                          <m:t>∗</m:t>
+                        </m:r>
+                      </m:sup>
+                    </m:sSup>
+                    <m:r>
+                      <a:rPr lang="en-US" sz="1600" b="0" i="1" smtClean="0">
+                        <a:latin typeface="Cambria Math" panose="02040503050406030204" pitchFamily="18" charset="0"/>
+                      </a:rPr>
+                      <m:t> </m:t>
+                    </m:r>
+                  </m:oMath>
+                </a14:m>
+                <a:endParaRPr lang="en-US" sz="1600" dirty="0"/>
+              </a:p>
+            </p:txBody>
+          </p:sp>
+        </mc:Choice>
+        <mc:Fallback>
+          <p:sp>
+            <p:nvSpPr>
+              <p:cNvPr id="38" name="TextBox 37">
+                <a:extLst>
+                  <a:ext uri="{FF2B5EF4-FFF2-40B4-BE49-F238E27FC236}">
+                    <a16:creationId xmlns:a16="http://schemas.microsoft.com/office/drawing/2014/main" id="{1B940FEA-C9FB-9A35-6062-2E30E7F88345}"/>
+                  </a:ext>
+                </a:extLst>
+              </p:cNvPr>
+              <p:cNvSpPr txBox="1">
+                <a:spLocks noRot="1" noChangeAspect="1" noMove="1" noResize="1" noEditPoints="1" noAdjustHandles="1" noChangeArrowheads="1" noChangeShapeType="1" noTextEdit="1"/>
+              </p:cNvSpPr>
+              <p:nvPr/>
+            </p:nvSpPr>
+            <p:spPr>
+              <a:xfrm>
+                <a:off x="11100089" y="3830699"/>
+                <a:ext cx="1069780" cy="338554"/>
+              </a:xfrm>
+              <a:prstGeom prst="rect">
+                <a:avLst/>
+              </a:prstGeom>
+              <a:blipFill>
+                <a:blip r:embed="rId10"/>
+                <a:stretch>
+                  <a:fillRect l="-3429" t="-5357" b="-21429"/>
                 </a:stretch>
               </a:blipFill>
             </p:spPr>
@@ -6498,8 +7320,8 @@
         </p:blipFill>
         <p:spPr>
           <a:xfrm>
-            <a:off x="1489541" y="2071688"/>
-            <a:ext cx="8181975" cy="4200525"/>
+            <a:off x="914400" y="1847697"/>
+            <a:ext cx="7764528" cy="3986213"/>
           </a:xfrm>
           <a:prstGeom prst="rect">
             <a:avLst/>
@@ -6520,8 +7342,8 @@
         </p:nvSpPr>
         <p:spPr>
           <a:xfrm>
-            <a:off x="1407457" y="1981200"/>
-            <a:ext cx="8041343" cy="4343400"/>
+            <a:off x="930797" y="1828800"/>
+            <a:ext cx="7540391" cy="3986213"/>
           </a:xfrm>
           <a:prstGeom prst="rect">
             <a:avLst/>
@@ -6666,8 +7488,8 @@
         </p:nvSpPr>
         <p:spPr>
           <a:xfrm>
-            <a:off x="8834258" y="4233710"/>
-            <a:ext cx="304800" cy="1752600"/>
+            <a:off x="7848600" y="4082377"/>
+            <a:ext cx="304800" cy="1118740"/>
           </a:xfrm>
           <a:prstGeom prst="rightBrace">
             <a:avLst/>
@@ -6696,8 +7518,8 @@
           </a:p>
         </p:txBody>
       </p:sp>
-      <mc:AlternateContent xmlns:mc="http://schemas.openxmlformats.org/markup-compatibility/2006" xmlns:a14="http://schemas.microsoft.com/office/drawing/2010/main">
-        <mc:Choice Requires="a14">
+      <mc:AlternateContent xmlns:mc="http://schemas.openxmlformats.org/markup-compatibility/2006">
+        <mc:Choice xmlns:a14="http://schemas.microsoft.com/office/drawing/2010/main" Requires="a14">
           <p:sp>
             <p:nvSpPr>
               <p:cNvPr id="9" name="TextBox 8">
@@ -6712,7 +7534,7 @@
             </p:nvSpPr>
             <p:spPr>
               <a:xfrm>
-                <a:off x="9123818" y="5916120"/>
+                <a:off x="6710665" y="5392402"/>
                 <a:ext cx="2885470" cy="729559"/>
               </a:xfrm>
               <a:prstGeom prst="rect">
@@ -6895,7 +7717,7 @@
             </p:txBody>
           </p:sp>
         </mc:Choice>
-        <mc:Fallback xmlns="">
+        <mc:Fallback>
           <p:sp>
             <p:nvSpPr>
               <p:cNvPr id="9" name="TextBox 8">
@@ -6912,7 +7734,7 @@
             </p:nvSpPr>
             <p:spPr>
               <a:xfrm>
-                <a:off x="9123818" y="5916120"/>
+                <a:off x="6710665" y="5392402"/>
                 <a:ext cx="2885470" cy="729559"/>
               </a:xfrm>
               <a:prstGeom prst="rect">
@@ -6921,7 +7743,7 @@
               <a:blipFill>
                 <a:blip r:embed="rId4"/>
                 <a:stretch>
-                  <a:fillRect l="-1684" t="-3279" r="-1474" b="-13115"/>
+                  <a:fillRect l="-1684" t="-4132" r="-1474" b="-14050"/>
                 </a:stretch>
               </a:blipFill>
             </p:spPr>
@@ -6954,13 +7776,13 @@
         </p:nvSpPr>
         <p:spPr>
           <a:xfrm>
-            <a:off x="6858000" y="3309041"/>
-            <a:ext cx="3657600" cy="809808"/>
+            <a:off x="5731189" y="3008483"/>
+            <a:ext cx="3274054" cy="1031848"/>
           </a:xfrm>
           <a:prstGeom prst="wedgeRoundRectCallout">
             <a:avLst>
-              <a:gd name="adj1" fmla="val -65187"/>
-              <a:gd name="adj2" fmla="val 14454"/>
+              <a:gd name="adj1" fmla="val -62359"/>
+              <a:gd name="adj2" fmla="val -5737"/>
               <a:gd name="adj3" fmla="val 16667"/>
             </a:avLst>
           </a:prstGeom>
@@ -6988,14 +7810,7 @@
             <a:pPr algn="ctr"/>
             <a:r>
               <a:rPr lang="en-US" dirty="0"/>
-              <a:t>Calculate U given current policy</a:t>
-            </a:r>
-            <a:br>
-              <a:rPr lang="en-US" dirty="0"/>
-            </a:br>
-            <a:r>
-              <a:rPr lang="en-US" dirty="0"/>
-              <a:t>(either solve an LP or value iteration with fixed policy)</a:t>
+              <a:t>Calculate U given current policy (either solve an LP or value iteration with fixed policy)</a:t>
             </a:r>
           </a:p>
         </p:txBody>
@@ -7014,7 +7829,7 @@
         </p:nvSpPr>
         <p:spPr>
           <a:xfrm>
-            <a:off x="9331558" y="4767110"/>
+            <a:off x="8243243" y="4298847"/>
             <a:ext cx="1524000" cy="685800"/>
           </a:xfrm>
           <a:prstGeom prst="roundRect">
@@ -7085,6 +7900,884 @@
             <a:r>
               <a:rPr lang="en-US" dirty="0"/>
               <a:t>Policy iteration tries to directly find the optimal policy by iterating policy evaluation and improvement.</a:t>
+            </a:r>
+          </a:p>
+        </p:txBody>
+      </p:sp>
+      <p:cxnSp>
+        <p:nvCxnSpPr>
+          <p:cNvPr id="3" name="Straight Connector 2">
+            <a:extLst>
+              <a:ext uri="{FF2B5EF4-FFF2-40B4-BE49-F238E27FC236}">
+                <a16:creationId xmlns:a16="http://schemas.microsoft.com/office/drawing/2014/main" id="{447A44AD-8292-96EC-1994-4950D408FAE5}"/>
+              </a:ext>
+            </a:extLst>
+          </p:cNvPr>
+          <p:cNvCxnSpPr>
+            <a:cxnSpLocks/>
+          </p:cNvCxnSpPr>
+          <p:nvPr/>
+        </p:nvCxnSpPr>
+        <p:spPr>
+          <a:xfrm>
+            <a:off x="9767243" y="2133600"/>
+            <a:ext cx="1963017" cy="990599"/>
+          </a:xfrm>
+          <a:prstGeom prst="line">
+            <a:avLst/>
+          </a:prstGeom>
+        </p:spPr>
+        <p:style>
+          <a:lnRef idx="1">
+            <a:schemeClr val="accent1"/>
+          </a:lnRef>
+          <a:fillRef idx="0">
+            <a:schemeClr val="accent1"/>
+          </a:fillRef>
+          <a:effectRef idx="0">
+            <a:schemeClr val="accent1"/>
+          </a:effectRef>
+          <a:fontRef idx="minor">
+            <a:schemeClr val="tx1"/>
+          </a:fontRef>
+        </p:style>
+      </p:cxnSp>
+      <mc:AlternateContent xmlns:mc="http://schemas.openxmlformats.org/markup-compatibility/2006">
+        <mc:Choice xmlns:a14="http://schemas.microsoft.com/office/drawing/2010/main" Requires="a14">
+          <p:sp>
+            <p:nvSpPr>
+              <p:cNvPr id="4" name="TextBox 3">
+                <a:extLst>
+                  <a:ext uri="{FF2B5EF4-FFF2-40B4-BE49-F238E27FC236}">
+                    <a16:creationId xmlns:a16="http://schemas.microsoft.com/office/drawing/2014/main" id="{19BECD92-8EB4-3F3A-747C-2F7B09A3A737}"/>
+                  </a:ext>
+                </a:extLst>
+              </p:cNvPr>
+              <p:cNvSpPr txBox="1"/>
+              <p:nvPr/>
+            </p:nvSpPr>
+            <p:spPr>
+              <a:xfrm>
+                <a:off x="11450082" y="2697769"/>
+                <a:ext cx="766996" cy="388568"/>
+              </a:xfrm>
+              <a:prstGeom prst="rect">
+                <a:avLst/>
+              </a:prstGeom>
+              <a:noFill/>
+            </p:spPr>
+            <p:txBody>
+              <a:bodyPr wrap="square">
+                <a:spAutoFit/>
+              </a:bodyPr>
+              <a:lstStyle/>
+              <a:p>
+                <a:pPr/>
+                <a14:m>
+                  <m:oMathPara xmlns:m="http://schemas.openxmlformats.org/officeDocument/2006/math">
+                    <m:oMathParaPr>
+                      <m:jc m:val="centerGroup"/>
+                    </m:oMathParaPr>
+                    <m:oMath xmlns:m="http://schemas.openxmlformats.org/officeDocument/2006/math">
+                      <m:sSup>
+                        <m:sSupPr>
+                          <m:ctrlPr>
+                            <a:rPr lang="en-US" sz="1800" i="1" smtClean="0">
+                              <a:latin typeface="Cambria Math" panose="02040503050406030204" pitchFamily="18" charset="0"/>
+                            </a:rPr>
+                          </m:ctrlPr>
+                        </m:sSupPr>
+                        <m:e>
+                          <m:r>
+                            <a:rPr lang="en-US" sz="1800" i="1">
+                              <a:latin typeface="Cambria Math" panose="02040503050406030204" pitchFamily="18" charset="0"/>
+                            </a:rPr>
+                            <m:t>𝑈</m:t>
+                          </m:r>
+                        </m:e>
+                        <m:sup>
+                          <m:sSup>
+                            <m:sSupPr>
+                              <m:ctrlPr>
+                                <a:rPr lang="en-US" sz="1800" i="1">
+                                  <a:latin typeface="Cambria Math" panose="02040503050406030204" pitchFamily="18" charset="0"/>
+                                </a:rPr>
+                              </m:ctrlPr>
+                            </m:sSupPr>
+                            <m:e>
+                              <m:r>
+                                <a:rPr lang="en-US" sz="1800" i="1">
+                                  <a:latin typeface="Cambria Math" panose="02040503050406030204" pitchFamily="18" charset="0"/>
+                                </a:rPr>
+                                <m:t>𝜋</m:t>
+                              </m:r>
+                            </m:e>
+                            <m:sup>
+                              <m:r>
+                                <a:rPr lang="en-US" sz="1800" i="1">
+                                  <a:latin typeface="Cambria Math" panose="02040503050406030204" pitchFamily="18" charset="0"/>
+                                </a:rPr>
+                                <m:t>∗</m:t>
+                              </m:r>
+                            </m:sup>
+                          </m:sSup>
+                        </m:sup>
+                      </m:sSup>
+                    </m:oMath>
+                  </m:oMathPara>
+                </a14:m>
+                <a:endParaRPr lang="en-US" dirty="0"/>
+              </a:p>
+            </p:txBody>
+          </p:sp>
+        </mc:Choice>
+        <mc:Fallback>
+          <p:sp>
+            <p:nvSpPr>
+              <p:cNvPr id="4" name="TextBox 3">
+                <a:extLst>
+                  <a:ext uri="{FF2B5EF4-FFF2-40B4-BE49-F238E27FC236}">
+                    <a16:creationId xmlns:a16="http://schemas.microsoft.com/office/drawing/2014/main" id="{19BECD92-8EB4-3F3A-747C-2F7B09A3A737}"/>
+                  </a:ext>
+                </a:extLst>
+              </p:cNvPr>
+              <p:cNvSpPr txBox="1">
+                <a:spLocks noRot="1" noChangeAspect="1" noMove="1" noResize="1" noEditPoints="1" noAdjustHandles="1" noChangeArrowheads="1" noChangeShapeType="1" noTextEdit="1"/>
+              </p:cNvSpPr>
+              <p:nvPr/>
+            </p:nvSpPr>
+            <p:spPr>
+              <a:xfrm>
+                <a:off x="11450082" y="2697769"/>
+                <a:ext cx="766996" cy="388568"/>
+              </a:xfrm>
+              <a:prstGeom prst="rect">
+                <a:avLst/>
+              </a:prstGeom>
+              <a:blipFill>
+                <a:blip r:embed="rId5"/>
+                <a:stretch>
+                  <a:fillRect/>
+                </a:stretch>
+              </a:blipFill>
+            </p:spPr>
+            <p:txBody>
+              <a:bodyPr/>
+              <a:lstStyle/>
+              <a:p>
+                <a:r>
+                  <a:rPr lang="en-US">
+                    <a:noFill/>
+                  </a:rPr>
+                  <a:t> </a:t>
+                </a:r>
+              </a:p>
+            </p:txBody>
+          </p:sp>
+        </mc:Fallback>
+      </mc:AlternateContent>
+      <mc:AlternateContent xmlns:mc="http://schemas.openxmlformats.org/markup-compatibility/2006">
+        <mc:Choice xmlns:a14="http://schemas.microsoft.com/office/drawing/2010/main" Requires="a14">
+          <p:sp>
+            <p:nvSpPr>
+              <p:cNvPr id="14" name="TextBox 13">
+                <a:extLst>
+                  <a:ext uri="{FF2B5EF4-FFF2-40B4-BE49-F238E27FC236}">
+                    <a16:creationId xmlns:a16="http://schemas.microsoft.com/office/drawing/2014/main" id="{FB9EE7AE-F5DB-6FED-EB86-DEBFF10FC2A3}"/>
+                  </a:ext>
+                </a:extLst>
+              </p:cNvPr>
+              <p:cNvSpPr txBox="1"/>
+              <p:nvPr/>
+            </p:nvSpPr>
+            <p:spPr>
+              <a:xfrm>
+                <a:off x="9767243" y="1765352"/>
+                <a:ext cx="395810" cy="369332"/>
+              </a:xfrm>
+              <a:prstGeom prst="rect">
+                <a:avLst/>
+              </a:prstGeom>
+              <a:noFill/>
+            </p:spPr>
+            <p:txBody>
+              <a:bodyPr wrap="square">
+                <a:spAutoFit/>
+              </a:bodyPr>
+              <a:lstStyle/>
+              <a:p>
+                <a:pPr/>
+                <a14:m>
+                  <m:oMathPara xmlns:m="http://schemas.openxmlformats.org/officeDocument/2006/math">
+                    <m:oMathParaPr>
+                      <m:jc m:val="centerGroup"/>
+                    </m:oMathParaPr>
+                    <m:oMath xmlns:m="http://schemas.openxmlformats.org/officeDocument/2006/math">
+                      <m:r>
+                        <a:rPr lang="en-US" sz="1800" b="0" i="1" smtClean="0">
+                          <a:latin typeface="Cambria Math" panose="02040503050406030204" pitchFamily="18" charset="0"/>
+                        </a:rPr>
+                        <m:t>𝑈</m:t>
+                      </m:r>
+                    </m:oMath>
+                  </m:oMathPara>
+                </a14:m>
+                <a:endParaRPr lang="en-US" dirty="0"/>
+              </a:p>
+            </p:txBody>
+          </p:sp>
+        </mc:Choice>
+        <mc:Fallback>
+          <p:sp>
+            <p:nvSpPr>
+              <p:cNvPr id="14" name="TextBox 13">
+                <a:extLst>
+                  <a:ext uri="{FF2B5EF4-FFF2-40B4-BE49-F238E27FC236}">
+                    <a16:creationId xmlns:a16="http://schemas.microsoft.com/office/drawing/2014/main" id="{FB9EE7AE-F5DB-6FED-EB86-DEBFF10FC2A3}"/>
+                  </a:ext>
+                </a:extLst>
+              </p:cNvPr>
+              <p:cNvSpPr txBox="1">
+                <a:spLocks noRot="1" noChangeAspect="1" noMove="1" noResize="1" noEditPoints="1" noAdjustHandles="1" noChangeArrowheads="1" noChangeShapeType="1" noTextEdit="1"/>
+              </p:cNvSpPr>
+              <p:nvPr/>
+            </p:nvSpPr>
+            <p:spPr>
+              <a:xfrm>
+                <a:off x="9767243" y="1765352"/>
+                <a:ext cx="395810" cy="369332"/>
+              </a:xfrm>
+              <a:prstGeom prst="rect">
+                <a:avLst/>
+              </a:prstGeom>
+              <a:blipFill>
+                <a:blip r:embed="rId6"/>
+                <a:stretch>
+                  <a:fillRect/>
+                </a:stretch>
+              </a:blipFill>
+            </p:spPr>
+            <p:txBody>
+              <a:bodyPr/>
+              <a:lstStyle/>
+              <a:p>
+                <a:r>
+                  <a:rPr lang="en-US">
+                    <a:noFill/>
+                  </a:rPr>
+                  <a:t> </a:t>
+                </a:r>
+              </a:p>
+            </p:txBody>
+          </p:sp>
+        </mc:Fallback>
+      </mc:AlternateContent>
+      <p:sp>
+        <p:nvSpPr>
+          <p:cNvPr id="17" name="Oval 16">
+            <a:extLst>
+              <a:ext uri="{FF2B5EF4-FFF2-40B4-BE49-F238E27FC236}">
+                <a16:creationId xmlns:a16="http://schemas.microsoft.com/office/drawing/2014/main" id="{E957BD3F-E8AA-B5A0-FC84-59F338DCDE83}"/>
+              </a:ext>
+            </a:extLst>
+          </p:cNvPr>
+          <p:cNvSpPr/>
+          <p:nvPr/>
+        </p:nvSpPr>
+        <p:spPr>
+          <a:xfrm>
+            <a:off x="11680507" y="3066584"/>
+            <a:ext cx="127995" cy="117892"/>
+          </a:xfrm>
+          <a:prstGeom prst="ellipse">
+            <a:avLst/>
+          </a:prstGeom>
+        </p:spPr>
+        <p:style>
+          <a:lnRef idx="2">
+            <a:schemeClr val="accent6">
+              <a:shade val="15000"/>
+            </a:schemeClr>
+          </a:lnRef>
+          <a:fillRef idx="1">
+            <a:schemeClr val="accent6"/>
+          </a:fillRef>
+          <a:effectRef idx="0">
+            <a:schemeClr val="accent6"/>
+          </a:effectRef>
+          <a:fontRef idx="minor">
+            <a:schemeClr val="lt1"/>
+          </a:fontRef>
+        </p:style>
+        <p:txBody>
+          <a:bodyPr rtlCol="0" anchor="ctr"/>
+          <a:lstStyle/>
+          <a:p>
+            <a:pPr algn="ctr"/>
+            <a:endParaRPr lang="en-US"/>
+          </a:p>
+        </p:txBody>
+      </p:sp>
+      <mc:AlternateContent xmlns:mc="http://schemas.openxmlformats.org/markup-compatibility/2006">
+        <mc:Choice xmlns:a14="http://schemas.microsoft.com/office/drawing/2010/main" Requires="a14">
+          <p:sp>
+            <p:nvSpPr>
+              <p:cNvPr id="21" name="TextBox 20">
+                <a:extLst>
+                  <a:ext uri="{FF2B5EF4-FFF2-40B4-BE49-F238E27FC236}">
+                    <a16:creationId xmlns:a16="http://schemas.microsoft.com/office/drawing/2014/main" id="{0F8E891D-D5E8-ACFF-2493-1B2D9A842592}"/>
+                  </a:ext>
+                </a:extLst>
+              </p:cNvPr>
+              <p:cNvSpPr txBox="1"/>
+              <p:nvPr/>
+            </p:nvSpPr>
+            <p:spPr>
+              <a:xfrm>
+                <a:off x="11450082" y="3185914"/>
+                <a:ext cx="670882" cy="369332"/>
+              </a:xfrm>
+              <a:prstGeom prst="rect">
+                <a:avLst/>
+              </a:prstGeom>
+              <a:noFill/>
+            </p:spPr>
+            <p:txBody>
+              <a:bodyPr wrap="square">
+                <a:spAutoFit/>
+              </a:bodyPr>
+              <a:lstStyle/>
+              <a:p>
+                <a:pPr/>
+                <a14:m>
+                  <m:oMathPara xmlns:m="http://schemas.openxmlformats.org/officeDocument/2006/math">
+                    <m:oMathParaPr>
+                      <m:jc m:val="centerGroup"/>
+                    </m:oMathParaPr>
+                    <m:oMath xmlns:m="http://schemas.openxmlformats.org/officeDocument/2006/math">
+                      <m:sSup>
+                        <m:sSupPr>
+                          <m:ctrlPr>
+                            <a:rPr lang="en-US" sz="1800" b="0" i="1" smtClean="0">
+                              <a:latin typeface="Cambria Math" panose="02040503050406030204" pitchFamily="18" charset="0"/>
+                            </a:rPr>
+                          </m:ctrlPr>
+                        </m:sSupPr>
+                        <m:e>
+                          <m:r>
+                            <a:rPr lang="en-US" sz="1800" b="0" i="1" smtClean="0">
+                              <a:latin typeface="Cambria Math" panose="02040503050406030204" pitchFamily="18" charset="0"/>
+                            </a:rPr>
+                            <m:t>𝜋</m:t>
+                          </m:r>
+                        </m:e>
+                        <m:sup>
+                          <m:r>
+                            <a:rPr lang="en-US" sz="1800" b="0" i="1" smtClean="0">
+                              <a:latin typeface="Cambria Math" panose="02040503050406030204" pitchFamily="18" charset="0"/>
+                            </a:rPr>
+                            <m:t>∗</m:t>
+                          </m:r>
+                        </m:sup>
+                      </m:sSup>
+                    </m:oMath>
+                  </m:oMathPara>
+                </a14:m>
+                <a:endParaRPr lang="en-US" dirty="0"/>
+              </a:p>
+            </p:txBody>
+          </p:sp>
+        </mc:Choice>
+        <mc:Fallback>
+          <p:sp>
+            <p:nvSpPr>
+              <p:cNvPr id="21" name="TextBox 20">
+                <a:extLst>
+                  <a:ext uri="{FF2B5EF4-FFF2-40B4-BE49-F238E27FC236}">
+                    <a16:creationId xmlns:a16="http://schemas.microsoft.com/office/drawing/2014/main" id="{0F8E891D-D5E8-ACFF-2493-1B2D9A842592}"/>
+                  </a:ext>
+                </a:extLst>
+              </p:cNvPr>
+              <p:cNvSpPr txBox="1">
+                <a:spLocks noRot="1" noChangeAspect="1" noMove="1" noResize="1" noEditPoints="1" noAdjustHandles="1" noChangeArrowheads="1" noChangeShapeType="1" noTextEdit="1"/>
+              </p:cNvSpPr>
+              <p:nvPr/>
+            </p:nvSpPr>
+            <p:spPr>
+              <a:xfrm>
+                <a:off x="11450082" y="3185914"/>
+                <a:ext cx="670882" cy="369332"/>
+              </a:xfrm>
+              <a:prstGeom prst="rect">
+                <a:avLst/>
+              </a:prstGeom>
+              <a:blipFill>
+                <a:blip r:embed="rId7"/>
+                <a:stretch>
+                  <a:fillRect/>
+                </a:stretch>
+              </a:blipFill>
+            </p:spPr>
+            <p:txBody>
+              <a:bodyPr/>
+              <a:lstStyle/>
+              <a:p>
+                <a:r>
+                  <a:rPr lang="en-US">
+                    <a:noFill/>
+                  </a:rPr>
+                  <a:t> </a:t>
+                </a:r>
+              </a:p>
+            </p:txBody>
+          </p:sp>
+        </mc:Fallback>
+      </mc:AlternateContent>
+      <mc:AlternateContent xmlns:mc="http://schemas.openxmlformats.org/markup-compatibility/2006">
+        <mc:Choice xmlns:a14="http://schemas.microsoft.com/office/drawing/2010/main" Requires="a14">
+          <p:sp>
+            <p:nvSpPr>
+              <p:cNvPr id="23" name="TextBox 22">
+                <a:extLst>
+                  <a:ext uri="{FF2B5EF4-FFF2-40B4-BE49-F238E27FC236}">
+                    <a16:creationId xmlns:a16="http://schemas.microsoft.com/office/drawing/2014/main" id="{855B6615-2A40-D9F1-B014-C079BEA81885}"/>
+                  </a:ext>
+                </a:extLst>
+              </p:cNvPr>
+              <p:cNvSpPr txBox="1"/>
+              <p:nvPr/>
+            </p:nvSpPr>
+            <p:spPr>
+              <a:xfrm>
+                <a:off x="9723059" y="3934915"/>
+                <a:ext cx="453512" cy="369332"/>
+              </a:xfrm>
+              <a:prstGeom prst="rect">
+                <a:avLst/>
+              </a:prstGeom>
+              <a:noFill/>
+            </p:spPr>
+            <p:txBody>
+              <a:bodyPr wrap="square">
+                <a:spAutoFit/>
+              </a:bodyPr>
+              <a:lstStyle/>
+              <a:p>
+                <a:pPr/>
+                <a14:m>
+                  <m:oMathPara xmlns:m="http://schemas.openxmlformats.org/officeDocument/2006/math">
+                    <m:oMathParaPr>
+                      <m:jc m:val="centerGroup"/>
+                    </m:oMathParaPr>
+                    <m:oMath xmlns:m="http://schemas.openxmlformats.org/officeDocument/2006/math">
+                      <m:r>
+                        <a:rPr lang="en-US" sz="1800" b="0" i="1" smtClean="0">
+                          <a:latin typeface="Cambria Math" panose="02040503050406030204" pitchFamily="18" charset="0"/>
+                        </a:rPr>
+                        <m:t>𝜋</m:t>
+                      </m:r>
+                    </m:oMath>
+                  </m:oMathPara>
+                </a14:m>
+                <a:endParaRPr lang="en-US" dirty="0"/>
+              </a:p>
+            </p:txBody>
+          </p:sp>
+        </mc:Choice>
+        <mc:Fallback>
+          <p:sp>
+            <p:nvSpPr>
+              <p:cNvPr id="23" name="TextBox 22">
+                <a:extLst>
+                  <a:ext uri="{FF2B5EF4-FFF2-40B4-BE49-F238E27FC236}">
+                    <a16:creationId xmlns:a16="http://schemas.microsoft.com/office/drawing/2014/main" id="{855B6615-2A40-D9F1-B014-C079BEA81885}"/>
+                  </a:ext>
+                </a:extLst>
+              </p:cNvPr>
+              <p:cNvSpPr txBox="1">
+                <a:spLocks noRot="1" noChangeAspect="1" noMove="1" noResize="1" noEditPoints="1" noAdjustHandles="1" noChangeArrowheads="1" noChangeShapeType="1" noTextEdit="1"/>
+              </p:cNvSpPr>
+              <p:nvPr/>
+            </p:nvSpPr>
+            <p:spPr>
+              <a:xfrm>
+                <a:off x="9723059" y="3934915"/>
+                <a:ext cx="453512" cy="369332"/>
+              </a:xfrm>
+              <a:prstGeom prst="rect">
+                <a:avLst/>
+              </a:prstGeom>
+              <a:blipFill>
+                <a:blip r:embed="rId8"/>
+                <a:stretch>
+                  <a:fillRect/>
+                </a:stretch>
+              </a:blipFill>
+            </p:spPr>
+            <p:txBody>
+              <a:bodyPr/>
+              <a:lstStyle/>
+              <a:p>
+                <a:r>
+                  <a:rPr lang="en-US">
+                    <a:noFill/>
+                  </a:rPr>
+                  <a:t> </a:t>
+                </a:r>
+              </a:p>
+            </p:txBody>
+          </p:sp>
+        </mc:Fallback>
+      </mc:AlternateContent>
+      <p:cxnSp>
+        <p:nvCxnSpPr>
+          <p:cNvPr id="24" name="Straight Connector 23">
+            <a:extLst>
+              <a:ext uri="{FF2B5EF4-FFF2-40B4-BE49-F238E27FC236}">
+                <a16:creationId xmlns:a16="http://schemas.microsoft.com/office/drawing/2014/main" id="{463B50D4-BD22-4970-434D-879A140DE0A4}"/>
+              </a:ext>
+            </a:extLst>
+          </p:cNvPr>
+          <p:cNvCxnSpPr>
+            <a:cxnSpLocks/>
+            <a:endCxn id="17" idx="4"/>
+          </p:cNvCxnSpPr>
+          <p:nvPr/>
+        </p:nvCxnSpPr>
+        <p:spPr>
+          <a:xfrm flipV="1">
+            <a:off x="9767243" y="3184476"/>
+            <a:ext cx="1977262" cy="897901"/>
+          </a:xfrm>
+          <a:prstGeom prst="line">
+            <a:avLst/>
+          </a:prstGeom>
+        </p:spPr>
+        <p:style>
+          <a:lnRef idx="1">
+            <a:schemeClr val="accent1"/>
+          </a:lnRef>
+          <a:fillRef idx="0">
+            <a:schemeClr val="accent1"/>
+          </a:fillRef>
+          <a:effectRef idx="0">
+            <a:schemeClr val="accent1"/>
+          </a:effectRef>
+          <a:fontRef idx="minor">
+            <a:schemeClr val="tx1"/>
+          </a:fontRef>
+        </p:style>
+      </p:cxnSp>
+      <p:cxnSp>
+        <p:nvCxnSpPr>
+          <p:cNvPr id="31" name="Straight Arrow Connector 30">
+            <a:extLst>
+              <a:ext uri="{FF2B5EF4-FFF2-40B4-BE49-F238E27FC236}">
+                <a16:creationId xmlns:a16="http://schemas.microsoft.com/office/drawing/2014/main" id="{E6948348-E14F-E78C-7925-6D07B342DDDD}"/>
+              </a:ext>
+            </a:extLst>
+          </p:cNvPr>
+          <p:cNvCxnSpPr/>
+          <p:nvPr/>
+        </p:nvCxnSpPr>
+        <p:spPr>
+          <a:xfrm flipV="1">
+            <a:off x="9982200" y="2438400"/>
+            <a:ext cx="360675" cy="1515404"/>
+          </a:xfrm>
+          <a:prstGeom prst="straightConnector1">
+            <a:avLst/>
+          </a:prstGeom>
+          <a:ln>
+            <a:tailEnd type="triangle"/>
+          </a:ln>
+        </p:spPr>
+        <p:style>
+          <a:lnRef idx="3">
+            <a:schemeClr val="accent6"/>
+          </a:lnRef>
+          <a:fillRef idx="0">
+            <a:schemeClr val="accent6"/>
+          </a:fillRef>
+          <a:effectRef idx="2">
+            <a:schemeClr val="accent6"/>
+          </a:effectRef>
+          <a:fontRef idx="minor">
+            <a:schemeClr val="tx1"/>
+          </a:fontRef>
+        </p:style>
+      </p:cxnSp>
+      <p:cxnSp>
+        <p:nvCxnSpPr>
+          <p:cNvPr id="32" name="Straight Arrow Connector 31">
+            <a:extLst>
+              <a:ext uri="{FF2B5EF4-FFF2-40B4-BE49-F238E27FC236}">
+                <a16:creationId xmlns:a16="http://schemas.microsoft.com/office/drawing/2014/main" id="{11A484C5-4702-A9B7-9D77-FC3973E8A67F}"/>
+              </a:ext>
+            </a:extLst>
+          </p:cNvPr>
+          <p:cNvCxnSpPr>
+            <a:cxnSpLocks/>
+          </p:cNvCxnSpPr>
+          <p:nvPr/>
+        </p:nvCxnSpPr>
+        <p:spPr>
+          <a:xfrm>
+            <a:off x="10342875" y="2438400"/>
+            <a:ext cx="325125" cy="1219200"/>
+          </a:xfrm>
+          <a:prstGeom prst="straightConnector1">
+            <a:avLst/>
+          </a:prstGeom>
+          <a:ln>
+            <a:tailEnd type="triangle"/>
+          </a:ln>
+        </p:spPr>
+        <p:style>
+          <a:lnRef idx="3">
+            <a:schemeClr val="accent6"/>
+          </a:lnRef>
+          <a:fillRef idx="0">
+            <a:schemeClr val="accent6"/>
+          </a:fillRef>
+          <a:effectRef idx="2">
+            <a:schemeClr val="accent6"/>
+          </a:effectRef>
+          <a:fontRef idx="minor">
+            <a:schemeClr val="tx1"/>
+          </a:fontRef>
+        </p:style>
+      </p:cxnSp>
+      <p:cxnSp>
+        <p:nvCxnSpPr>
+          <p:cNvPr id="37" name="Straight Arrow Connector 36">
+            <a:extLst>
+              <a:ext uri="{FF2B5EF4-FFF2-40B4-BE49-F238E27FC236}">
+                <a16:creationId xmlns:a16="http://schemas.microsoft.com/office/drawing/2014/main" id="{FEB4DCB4-48A5-6E51-B9FE-EF0E9B4BAFF8}"/>
+              </a:ext>
+            </a:extLst>
+          </p:cNvPr>
+          <p:cNvCxnSpPr>
+            <a:cxnSpLocks/>
+          </p:cNvCxnSpPr>
+          <p:nvPr/>
+        </p:nvCxnSpPr>
+        <p:spPr>
+          <a:xfrm flipV="1">
+            <a:off x="10668000" y="2819400"/>
+            <a:ext cx="457200" cy="838200"/>
+          </a:xfrm>
+          <a:prstGeom prst="straightConnector1">
+            <a:avLst/>
+          </a:prstGeom>
+          <a:ln>
+            <a:tailEnd type="triangle"/>
+          </a:ln>
+        </p:spPr>
+        <p:style>
+          <a:lnRef idx="3">
+            <a:schemeClr val="accent6"/>
+          </a:lnRef>
+          <a:fillRef idx="0">
+            <a:schemeClr val="accent6"/>
+          </a:fillRef>
+          <a:effectRef idx="2">
+            <a:schemeClr val="accent6"/>
+          </a:effectRef>
+          <a:fontRef idx="minor">
+            <a:schemeClr val="tx1"/>
+          </a:fontRef>
+        </p:style>
+      </p:cxnSp>
+      <p:cxnSp>
+        <p:nvCxnSpPr>
+          <p:cNvPr id="44" name="Straight Arrow Connector 43">
+            <a:extLst>
+              <a:ext uri="{FF2B5EF4-FFF2-40B4-BE49-F238E27FC236}">
+                <a16:creationId xmlns:a16="http://schemas.microsoft.com/office/drawing/2014/main" id="{6CB15DB5-D53A-F51F-8727-21F569598D38}"/>
+              </a:ext>
+            </a:extLst>
+          </p:cNvPr>
+          <p:cNvCxnSpPr>
+            <a:cxnSpLocks/>
+          </p:cNvCxnSpPr>
+          <p:nvPr/>
+        </p:nvCxnSpPr>
+        <p:spPr>
+          <a:xfrm>
+            <a:off x="11125200" y="2819400"/>
+            <a:ext cx="228600" cy="533400"/>
+          </a:xfrm>
+          <a:prstGeom prst="straightConnector1">
+            <a:avLst/>
+          </a:prstGeom>
+          <a:ln>
+            <a:tailEnd type="triangle"/>
+          </a:ln>
+        </p:spPr>
+        <p:style>
+          <a:lnRef idx="3">
+            <a:schemeClr val="accent6"/>
+          </a:lnRef>
+          <a:fillRef idx="0">
+            <a:schemeClr val="accent6"/>
+          </a:fillRef>
+          <a:effectRef idx="2">
+            <a:schemeClr val="accent6"/>
+          </a:effectRef>
+          <a:fontRef idx="minor">
+            <a:schemeClr val="tx1"/>
+          </a:fontRef>
+        </p:style>
+      </p:cxnSp>
+      <p:cxnSp>
+        <p:nvCxnSpPr>
+          <p:cNvPr id="47" name="Straight Arrow Connector 46">
+            <a:extLst>
+              <a:ext uri="{FF2B5EF4-FFF2-40B4-BE49-F238E27FC236}">
+                <a16:creationId xmlns:a16="http://schemas.microsoft.com/office/drawing/2014/main" id="{B79E848C-DEE2-2B22-D382-CB1D0AFA6287}"/>
+              </a:ext>
+            </a:extLst>
+          </p:cNvPr>
+          <p:cNvCxnSpPr>
+            <a:cxnSpLocks/>
+          </p:cNvCxnSpPr>
+          <p:nvPr/>
+        </p:nvCxnSpPr>
+        <p:spPr>
+          <a:xfrm flipV="1">
+            <a:off x="11353800" y="3066584"/>
+            <a:ext cx="228600" cy="286216"/>
+          </a:xfrm>
+          <a:prstGeom prst="straightConnector1">
+            <a:avLst/>
+          </a:prstGeom>
+          <a:ln>
+            <a:tailEnd type="triangle"/>
+          </a:ln>
+        </p:spPr>
+        <p:style>
+          <a:lnRef idx="3">
+            <a:schemeClr val="accent6"/>
+          </a:lnRef>
+          <a:fillRef idx="0">
+            <a:schemeClr val="accent6"/>
+          </a:fillRef>
+          <a:effectRef idx="2">
+            <a:schemeClr val="accent6"/>
+          </a:effectRef>
+          <a:fontRef idx="minor">
+            <a:schemeClr val="tx1"/>
+          </a:fontRef>
+        </p:style>
+      </p:cxnSp>
+      <p:cxnSp>
+        <p:nvCxnSpPr>
+          <p:cNvPr id="50" name="Straight Arrow Connector 49">
+            <a:extLst>
+              <a:ext uri="{FF2B5EF4-FFF2-40B4-BE49-F238E27FC236}">
+                <a16:creationId xmlns:a16="http://schemas.microsoft.com/office/drawing/2014/main" id="{2F360256-AFD1-C0BB-ABF4-6ED717BE241E}"/>
+              </a:ext>
+            </a:extLst>
+          </p:cNvPr>
+          <p:cNvCxnSpPr>
+            <a:cxnSpLocks/>
+          </p:cNvCxnSpPr>
+          <p:nvPr/>
+        </p:nvCxnSpPr>
+        <p:spPr>
+          <a:xfrm>
+            <a:off x="11582400" y="3086337"/>
+            <a:ext cx="98107" cy="114063"/>
+          </a:xfrm>
+          <a:prstGeom prst="straightConnector1">
+            <a:avLst/>
+          </a:prstGeom>
+          <a:ln>
+            <a:tailEnd type="triangle"/>
+          </a:ln>
+        </p:spPr>
+        <p:style>
+          <a:lnRef idx="3">
+            <a:schemeClr val="accent6"/>
+          </a:lnRef>
+          <a:fillRef idx="0">
+            <a:schemeClr val="accent6"/>
+          </a:fillRef>
+          <a:effectRef idx="2">
+            <a:schemeClr val="accent6"/>
+          </a:effectRef>
+          <a:fontRef idx="minor">
+            <a:schemeClr val="tx1"/>
+          </a:fontRef>
+        </p:style>
+      </p:cxnSp>
+      <p:sp>
+        <p:nvSpPr>
+          <p:cNvPr id="57" name="TextBox 56">
+            <a:extLst>
+              <a:ext uri="{FF2B5EF4-FFF2-40B4-BE49-F238E27FC236}">
+                <a16:creationId xmlns:a16="http://schemas.microsoft.com/office/drawing/2014/main" id="{AFD80097-9184-52DD-89E7-0E2ED869BB5C}"/>
+              </a:ext>
+            </a:extLst>
+          </p:cNvPr>
+          <p:cNvSpPr txBox="1"/>
+          <p:nvPr/>
+        </p:nvSpPr>
+        <p:spPr>
+          <a:xfrm rot="17007305">
+            <a:off x="9413809" y="3067737"/>
+            <a:ext cx="1236749" cy="276999"/>
+          </a:xfrm>
+          <a:prstGeom prst="rect">
+            <a:avLst/>
+          </a:prstGeom>
+          <a:noFill/>
+        </p:spPr>
+        <p:txBody>
+          <a:bodyPr wrap="none" rtlCol="0">
+            <a:spAutoFit/>
+          </a:bodyPr>
+          <a:lstStyle/>
+          <a:p>
+            <a:r>
+              <a:rPr lang="en-US" sz="1200" dirty="0"/>
+              <a:t>Policy evaluation</a:t>
+            </a:r>
+          </a:p>
+        </p:txBody>
+      </p:sp>
+      <p:sp>
+        <p:nvSpPr>
+          <p:cNvPr id="58" name="TextBox 57">
+            <a:extLst>
+              <a:ext uri="{FF2B5EF4-FFF2-40B4-BE49-F238E27FC236}">
+                <a16:creationId xmlns:a16="http://schemas.microsoft.com/office/drawing/2014/main" id="{17FBEAB6-A067-564C-70A8-D8E9A5A200F3}"/>
+              </a:ext>
+            </a:extLst>
+          </p:cNvPr>
+          <p:cNvSpPr txBox="1"/>
+          <p:nvPr/>
+        </p:nvSpPr>
+        <p:spPr>
+          <a:xfrm rot="4498548">
+            <a:off x="10061465" y="2911840"/>
+            <a:ext cx="1103187" cy="261610"/>
+          </a:xfrm>
+          <a:prstGeom prst="rect">
+            <a:avLst/>
+          </a:prstGeom>
+          <a:noFill/>
+        </p:spPr>
+        <p:txBody>
+          <a:bodyPr wrap="none" rtlCol="0">
+            <a:spAutoFit/>
+          </a:bodyPr>
+          <a:lstStyle/>
+          <a:p>
+            <a:r>
+              <a:rPr lang="en-US" sz="1100" dirty="0"/>
+              <a:t>P. improvement</a:t>
             </a:r>
           </a:p>
         </p:txBody>
@@ -8652,8 +10345,8 @@
             </p:sp>
           </mc:Fallback>
         </mc:AlternateContent>
-        <mc:AlternateContent xmlns:mc="http://schemas.openxmlformats.org/markup-compatibility/2006">
-          <mc:Choice xmlns:a14="http://schemas.microsoft.com/office/drawing/2010/main" Requires="a14">
+        <mc:AlternateContent xmlns:mc="http://schemas.openxmlformats.org/markup-compatibility/2006" xmlns:a14="http://schemas.microsoft.com/office/drawing/2010/main">
+          <mc:Choice Requires="a14">
             <p:sp>
               <p:nvSpPr>
                 <p:cNvPr id="30" name="Rectangle 29">
@@ -8739,7 +10432,7 @@
               </p:txBody>
             </p:sp>
           </mc:Choice>
-          <mc:Fallback>
+          <mc:Fallback xmlns="">
             <p:sp>
               <p:nvSpPr>
                 <p:cNvPr id="30" name="Rectangle 29">
@@ -8784,8 +10477,8 @@
             </p:sp>
           </mc:Fallback>
         </mc:AlternateContent>
-        <mc:AlternateContent xmlns:mc="http://schemas.openxmlformats.org/markup-compatibility/2006">
-          <mc:Choice xmlns:a14="http://schemas.microsoft.com/office/drawing/2010/main" Requires="a14">
+        <mc:AlternateContent xmlns:mc="http://schemas.openxmlformats.org/markup-compatibility/2006" xmlns:a14="http://schemas.microsoft.com/office/drawing/2010/main">
+          <mc:Choice Requires="a14">
             <p:sp>
               <p:nvSpPr>
                 <p:cNvPr id="32" name="Rectangle 31">
@@ -8871,7 +10564,7 @@
               </p:txBody>
             </p:sp>
           </mc:Choice>
-          <mc:Fallback>
+          <mc:Fallback xmlns="">
             <p:sp>
               <p:nvSpPr>
                 <p:cNvPr id="32" name="Rectangle 31">
@@ -9909,8 +11602,8 @@
           </a:p>
         </p:txBody>
       </p:sp>
-      <mc:AlternateContent xmlns:mc="http://schemas.openxmlformats.org/markup-compatibility/2006">
-        <mc:Choice xmlns:a14="http://schemas.microsoft.com/office/drawing/2010/main" Requires="a14">
+      <mc:AlternateContent xmlns:mc="http://schemas.openxmlformats.org/markup-compatibility/2006" xmlns:a14="http://schemas.microsoft.com/office/drawing/2010/main">
+        <mc:Choice Requires="a14">
           <p:sp>
             <p:nvSpPr>
               <p:cNvPr id="3" name="Content Placeholder 2">
@@ -9975,7 +11668,7 @@
             </p:txBody>
           </p:sp>
         </mc:Choice>
-        <mc:Fallback>
+        <mc:Fallback xmlns="">
           <p:sp>
             <p:nvSpPr>
               <p:cNvPr id="3" name="Content Placeholder 2">
@@ -10390,8 +12083,8 @@
           </a:p>
         </p:txBody>
       </p:sp>
-      <mc:AlternateContent xmlns:mc="http://schemas.openxmlformats.org/markup-compatibility/2006">
-        <mc:Choice xmlns:a14="http://schemas.microsoft.com/office/drawing/2010/main" Requires="a14">
+      <mc:AlternateContent xmlns:mc="http://schemas.openxmlformats.org/markup-compatibility/2006" xmlns:a14="http://schemas.microsoft.com/office/drawing/2010/main">
+        <mc:Choice Requires="a14">
           <p:graphicFrame>
             <p:nvGraphicFramePr>
               <p:cNvPr id="4" name="Table 3">
@@ -10451,6 +12144,7 @@
                         <a:bodyPr/>
                         <a:lstStyle/>
                         <a:p>
+                          <a:pPr/>
                           <a14:m>
                             <m:oMathPara xmlns:m="http://schemas.openxmlformats.org/officeDocument/2006/math">
                               <m:oMathParaPr>
@@ -10458,7 +12152,9 @@
                               </m:oMathParaPr>
                               <m:oMath xmlns:m="http://schemas.openxmlformats.org/officeDocument/2006/math">
                                 <m:r>
-                                  <a:rPr lang="en-US" dirty="0" smtClean="0"/>
+                                  <a:rPr lang="en-US" dirty="0" smtClean="0">
+                                    <a:latin typeface="Cambria Math" panose="02040503050406030204" pitchFamily="18" charset="0"/>
+                                  </a:rPr>
                                   <m:t>𝑠</m:t>
                                 </m:r>
                               </m:oMath>
@@ -10474,6 +12170,7 @@
                         <a:bodyPr/>
                         <a:lstStyle/>
                         <a:p>
+                          <a:pPr/>
                           <a14:m>
                             <m:oMathPara xmlns:m="http://schemas.openxmlformats.org/officeDocument/2006/math">
                               <m:oMathParaPr>
@@ -10481,7 +12178,9 @@
                               </m:oMathParaPr>
                               <m:oMath xmlns:m="http://schemas.openxmlformats.org/officeDocument/2006/math">
                                 <m:r>
-                                  <a:rPr lang="en-US" dirty="0" smtClean="0"/>
+                                  <a:rPr lang="en-US" dirty="0" smtClean="0">
+                                    <a:latin typeface="Cambria Math" panose="02040503050406030204" pitchFamily="18" charset="0"/>
+                                  </a:rPr>
                                   <m:t>𝑎</m:t>
                                 </m:r>
                               </m:oMath>
@@ -10497,6 +12196,7 @@
                         <a:bodyPr/>
                         <a:lstStyle/>
                         <a:p>
+                          <a:pPr/>
                           <a14:m>
                             <m:oMathPara xmlns:m="http://schemas.openxmlformats.org/officeDocument/2006/math">
                               <m:oMathParaPr>
@@ -10504,27 +12204,39 @@
                               </m:oMathParaPr>
                               <m:oMath xmlns:m="http://schemas.openxmlformats.org/officeDocument/2006/math">
                                 <m:r>
-                                  <a:rPr lang="en-US" dirty="0" smtClean="0"/>
+                                  <a:rPr lang="en-US" dirty="0" smtClean="0">
+                                    <a:latin typeface="Cambria Math" panose="02040503050406030204" pitchFamily="18" charset="0"/>
+                                  </a:rPr>
                                   <m:t>𝑄</m:t>
                                 </m:r>
                                 <m:r>
-                                  <a:rPr lang="en-US" dirty="0" smtClean="0"/>
+                                  <a:rPr lang="en-US" dirty="0" smtClean="0">
+                                    <a:latin typeface="Cambria Math" panose="02040503050406030204" pitchFamily="18" charset="0"/>
+                                  </a:rPr>
                                   <m:t>(</m:t>
                                 </m:r>
                                 <m:r>
-                                  <a:rPr lang="en-US" dirty="0" err="1" smtClean="0"/>
+                                  <a:rPr lang="en-US" dirty="0" err="1" smtClean="0">
+                                    <a:latin typeface="Cambria Math" panose="02040503050406030204" pitchFamily="18" charset="0"/>
+                                  </a:rPr>
                                   <m:t>𝑠</m:t>
                                 </m:r>
                                 <m:r>
-                                  <a:rPr lang="en-US" dirty="0" err="1" smtClean="0"/>
+                                  <a:rPr lang="en-US" dirty="0" err="1" smtClean="0">
+                                    <a:latin typeface="Cambria Math" panose="02040503050406030204" pitchFamily="18" charset="0"/>
+                                  </a:rPr>
                                   <m:t>,</m:t>
                                 </m:r>
                                 <m:r>
-                                  <a:rPr lang="en-US" dirty="0" err="1" smtClean="0"/>
+                                  <a:rPr lang="en-US" dirty="0" err="1" smtClean="0">
+                                    <a:latin typeface="Cambria Math" panose="02040503050406030204" pitchFamily="18" charset="0"/>
+                                  </a:rPr>
                                   <m:t>𝑎</m:t>
                                 </m:r>
                                 <m:r>
-                                  <a:rPr lang="en-US" dirty="0" smtClean="0"/>
+                                  <a:rPr lang="en-US" dirty="0" smtClean="0">
+                                    <a:latin typeface="Cambria Math" panose="02040503050406030204" pitchFamily="18" charset="0"/>
+                                  </a:rPr>
                                   <m:t>)</m:t>
                                 </m:r>
                               </m:oMath>
@@ -10657,7 +12369,7 @@
             </a:graphic>
           </p:graphicFrame>
         </mc:Choice>
-        <mc:Fallback>
+        <mc:Fallback xmlns="">
           <p:graphicFrame>
             <p:nvGraphicFramePr>
               <p:cNvPr id="4" name="Table 3">
@@ -11009,8 +12721,8 @@
           </a:p>
         </p:txBody>
       </p:sp>
-      <mc:AlternateContent xmlns:mc="http://schemas.openxmlformats.org/markup-compatibility/2006">
-        <mc:Choice xmlns:a14="http://schemas.microsoft.com/office/drawing/2010/main" Requires="a14">
+      <mc:AlternateContent xmlns:mc="http://schemas.openxmlformats.org/markup-compatibility/2006" xmlns:a14="http://schemas.microsoft.com/office/drawing/2010/main">
+        <mc:Choice Requires="a14">
           <p:sp>
             <p:nvSpPr>
               <p:cNvPr id="3" name="Content Placeholder 2">
@@ -11275,7 +12987,7 @@
             </p:txBody>
           </p:sp>
         </mc:Choice>
-        <mc:Fallback>
+        <mc:Fallback xmlns="">
           <p:sp>
             <p:nvSpPr>
               <p:cNvPr id="3" name="Content Placeholder 2">
@@ -11319,8 +13031,8 @@
           </p:sp>
         </mc:Fallback>
       </mc:AlternateContent>
-      <mc:AlternateContent xmlns:mc="http://schemas.openxmlformats.org/markup-compatibility/2006">
-        <mc:Choice xmlns:a14="http://schemas.microsoft.com/office/drawing/2010/main" Requires="a14">
+      <mc:AlternateContent xmlns:mc="http://schemas.openxmlformats.org/markup-compatibility/2006" xmlns:a14="http://schemas.microsoft.com/office/drawing/2010/main">
+        <mc:Choice Requires="a14">
           <p:sp>
             <p:nvSpPr>
               <p:cNvPr id="8" name="TextBox 7">
@@ -11388,7 +13100,7 @@
             </p:txBody>
           </p:sp>
         </mc:Choice>
-        <mc:Fallback>
+        <mc:Fallback xmlns="">
           <p:sp>
             <p:nvSpPr>
               <p:cNvPr id="8" name="TextBox 7">
@@ -11433,8 +13145,8 @@
           </p:sp>
         </mc:Fallback>
       </mc:AlternateContent>
-      <mc:AlternateContent xmlns:mc="http://schemas.openxmlformats.org/markup-compatibility/2006">
-        <mc:Choice xmlns:a14="http://schemas.microsoft.com/office/drawing/2010/main" Requires="a14">
+      <mc:AlternateContent xmlns:mc="http://schemas.openxmlformats.org/markup-compatibility/2006" xmlns:a14="http://schemas.microsoft.com/office/drawing/2010/main">
+        <mc:Choice Requires="a14">
           <p:sp>
             <p:nvSpPr>
               <p:cNvPr id="9" name="Arrow: Right 8">
@@ -11532,7 +13244,7 @@
             </p:txBody>
           </p:sp>
         </mc:Choice>
-        <mc:Fallback>
+        <mc:Fallback xmlns="">
           <p:sp>
             <p:nvSpPr>
               <p:cNvPr id="9" name="Arrow: Right 8">
@@ -11580,8 +13292,8 @@
           </p:sp>
         </mc:Fallback>
       </mc:AlternateContent>
-      <mc:AlternateContent xmlns:mc="http://schemas.openxmlformats.org/markup-compatibility/2006">
-        <mc:Choice xmlns:a14="http://schemas.microsoft.com/office/drawing/2010/main" Requires="a14">
+      <mc:AlternateContent xmlns:mc="http://schemas.openxmlformats.org/markup-compatibility/2006" xmlns:a14="http://schemas.microsoft.com/office/drawing/2010/main">
+        <mc:Choice Requires="a14">
           <p:sp>
             <p:nvSpPr>
               <p:cNvPr id="11" name="TextBox 10">
@@ -11809,7 +13521,7 @@
             </p:txBody>
           </p:sp>
         </mc:Choice>
-        <mc:Fallback>
+        <mc:Fallback xmlns="">
           <p:sp>
             <p:nvSpPr>
               <p:cNvPr id="11" name="TextBox 10">
@@ -11854,8 +13566,8 @@
           </p:sp>
         </mc:Fallback>
       </mc:AlternateContent>
-      <mc:AlternateContent xmlns:mc="http://schemas.openxmlformats.org/markup-compatibility/2006">
-        <mc:Choice xmlns:a14="http://schemas.microsoft.com/office/drawing/2010/main" Requires="a14">
+      <mc:AlternateContent xmlns:mc="http://schemas.openxmlformats.org/markup-compatibility/2006" xmlns:a14="http://schemas.microsoft.com/office/drawing/2010/main">
+        <mc:Choice Requires="a14">
           <p:sp>
             <p:nvSpPr>
               <p:cNvPr id="4" name="TextBox 3">
@@ -11902,7 +13614,7 @@
             </p:txBody>
           </p:sp>
         </mc:Choice>
-        <mc:Fallback>
+        <mc:Fallback xmlns="">
           <p:sp>
             <p:nvSpPr>
               <p:cNvPr id="4" name="TextBox 3">
@@ -11977,8 +13689,8 @@
           <a:chExt cx="0" cy="0"/>
         </a:xfrm>
       </p:grpSpPr>
-      <mc:AlternateContent xmlns:mc="http://schemas.openxmlformats.org/markup-compatibility/2006">
-        <mc:Choice xmlns:a14="http://schemas.microsoft.com/office/drawing/2010/main" Requires="a14">
+      <mc:AlternateContent xmlns:mc="http://schemas.openxmlformats.org/markup-compatibility/2006" xmlns:a14="http://schemas.microsoft.com/office/drawing/2010/main">
+        <mc:Choice Requires="a14">
           <p:graphicFrame>
             <p:nvGraphicFramePr>
               <p:cNvPr id="4" name="Table 3">
@@ -12046,7 +13758,9 @@
                               </m:oMathParaPr>
                               <m:oMath xmlns:m="http://schemas.openxmlformats.org/officeDocument/2006/math">
                                 <m:r>
-                                  <a:rPr lang="en-US" sz="1600" dirty="0" smtClean="0"/>
+                                  <a:rPr lang="en-US" sz="1600" dirty="0" smtClean="0">
+                                    <a:latin typeface="Cambria Math" panose="02040503050406030204" pitchFamily="18" charset="0"/>
+                                  </a:rPr>
                                   <m:t>𝑠</m:t>
                                 </m:r>
                               </m:oMath>
@@ -12070,7 +13784,9 @@
                               </m:oMathParaPr>
                               <m:oMath xmlns:m="http://schemas.openxmlformats.org/officeDocument/2006/math">
                                 <m:r>
-                                  <a:rPr lang="en-US" sz="1600" dirty="0" smtClean="0"/>
+                                  <a:rPr lang="en-US" sz="1600" dirty="0" smtClean="0">
+                                    <a:latin typeface="Cambria Math" panose="02040503050406030204" pitchFamily="18" charset="0"/>
+                                  </a:rPr>
                                   <m:t>𝑎</m:t>
                                 </m:r>
                               </m:oMath>
@@ -12094,27 +13810,39 @@
                               </m:oMathParaPr>
                               <m:oMath xmlns:m="http://schemas.openxmlformats.org/officeDocument/2006/math">
                                 <m:r>
-                                  <a:rPr lang="en-US" sz="1600" dirty="0" smtClean="0"/>
+                                  <a:rPr lang="en-US" sz="1600" dirty="0" smtClean="0">
+                                    <a:latin typeface="Cambria Math" panose="02040503050406030204" pitchFamily="18" charset="0"/>
+                                  </a:rPr>
                                   <m:t>𝑄</m:t>
                                 </m:r>
                                 <m:r>
-                                  <a:rPr lang="en-US" sz="1600" dirty="0" smtClean="0"/>
+                                  <a:rPr lang="en-US" sz="1600" dirty="0" smtClean="0">
+                                    <a:latin typeface="Cambria Math" panose="02040503050406030204" pitchFamily="18" charset="0"/>
+                                  </a:rPr>
                                   <m:t>(</m:t>
                                 </m:r>
                                 <m:r>
-                                  <a:rPr lang="en-US" sz="1600" dirty="0" err="1" smtClean="0"/>
+                                  <a:rPr lang="en-US" sz="1600" dirty="0" err="1" smtClean="0">
+                                    <a:latin typeface="Cambria Math" panose="02040503050406030204" pitchFamily="18" charset="0"/>
+                                  </a:rPr>
                                   <m:t>𝑠</m:t>
                                 </m:r>
                                 <m:r>
-                                  <a:rPr lang="en-US" sz="1600" dirty="0" err="1" smtClean="0"/>
+                                  <a:rPr lang="en-US" sz="1600" dirty="0" err="1" smtClean="0">
+                                    <a:latin typeface="Cambria Math" panose="02040503050406030204" pitchFamily="18" charset="0"/>
+                                  </a:rPr>
                                   <m:t>,</m:t>
                                 </m:r>
                                 <m:r>
-                                  <a:rPr lang="en-US" sz="1600" dirty="0" err="1" smtClean="0"/>
+                                  <a:rPr lang="en-US" sz="1600" dirty="0" err="1" smtClean="0">
+                                    <a:latin typeface="Cambria Math" panose="02040503050406030204" pitchFamily="18" charset="0"/>
+                                  </a:rPr>
                                   <m:t>𝑎</m:t>
                                 </m:r>
                                 <m:r>
-                                  <a:rPr lang="en-US" sz="1600" dirty="0" smtClean="0"/>
+                                  <a:rPr lang="en-US" sz="1600" dirty="0" smtClean="0">
+                                    <a:latin typeface="Cambria Math" panose="02040503050406030204" pitchFamily="18" charset="0"/>
+                                  </a:rPr>
                                   <m:t>)</m:t>
                                 </m:r>
                               </m:oMath>
@@ -12283,7 +14011,7 @@
             </a:graphic>
           </p:graphicFrame>
         </mc:Choice>
-        <mc:Fallback>
+        <mc:Fallback xmlns="">
           <p:graphicFrame>
             <p:nvGraphicFramePr>
               <p:cNvPr id="4" name="Table 3">
@@ -12706,8 +14434,8 @@
           </a:p>
         </p:txBody>
       </p:sp>
-      <mc:AlternateContent xmlns:mc="http://schemas.openxmlformats.org/markup-compatibility/2006">
-        <mc:Choice xmlns:a14="http://schemas.microsoft.com/office/drawing/2010/main" Requires="a14">
+      <mc:AlternateContent xmlns:mc="http://schemas.openxmlformats.org/markup-compatibility/2006" xmlns:a14="http://schemas.microsoft.com/office/drawing/2010/main">
+        <mc:Choice Requires="a14">
           <p:sp>
             <p:nvSpPr>
               <p:cNvPr id="17" name="TextBox 16">
@@ -12736,6 +14464,7 @@
               </a:bodyPr>
               <a:lstStyle/>
               <a:p>
+                <a:pPr/>
                 <a14:m>
                   <m:oMathPara xmlns:m="http://schemas.openxmlformats.org/officeDocument/2006/math">
                     <m:oMathParaPr>
@@ -12756,7 +14485,7 @@
             </p:txBody>
           </p:sp>
         </mc:Choice>
-        <mc:Fallback>
+        <mc:Fallback xmlns="">
           <p:sp>
             <p:nvSpPr>
               <p:cNvPr id="17" name="TextBox 16">
@@ -12801,8 +14530,8 @@
           </p:sp>
         </mc:Fallback>
       </mc:AlternateContent>
-      <mc:AlternateContent xmlns:mc="http://schemas.openxmlformats.org/markup-compatibility/2006">
-        <mc:Choice xmlns:a14="http://schemas.microsoft.com/office/drawing/2010/main" Requires="a14">
+      <mc:AlternateContent xmlns:mc="http://schemas.openxmlformats.org/markup-compatibility/2006" xmlns:a14="http://schemas.microsoft.com/office/drawing/2010/main">
+        <mc:Choice Requires="a14">
           <p:sp>
             <p:nvSpPr>
               <p:cNvPr id="18" name="TextBox 17">
@@ -12831,6 +14560,7 @@
               </a:bodyPr>
               <a:lstStyle/>
               <a:p>
+                <a:pPr/>
                 <a14:m>
                   <m:oMathPara xmlns:m="http://schemas.openxmlformats.org/officeDocument/2006/math">
                     <m:oMathParaPr>
@@ -12881,7 +14611,7 @@
             </p:txBody>
           </p:sp>
         </mc:Choice>
-        <mc:Fallback>
+        <mc:Fallback xmlns="">
           <p:sp>
             <p:nvSpPr>
               <p:cNvPr id="18" name="TextBox 17">
@@ -15901,8 +17631,8 @@
           </a:p>
         </p:txBody>
       </p:sp>
-      <mc:AlternateContent xmlns:mc="http://schemas.openxmlformats.org/markup-compatibility/2006">
-        <mc:Choice xmlns:a14="http://schemas.microsoft.com/office/drawing/2010/main" Requires="a14">
+      <mc:AlternateContent xmlns:mc="http://schemas.openxmlformats.org/markup-compatibility/2006" xmlns:a14="http://schemas.microsoft.com/office/drawing/2010/main">
+        <mc:Choice Requires="a14">
           <p:sp>
             <p:nvSpPr>
               <p:cNvPr id="194" name="TextBox 193">
@@ -15931,6 +17661,7 @@
               </a:bodyPr>
               <a:lstStyle/>
               <a:p>
+                <a:pPr/>
                 <a14:m>
                   <m:oMathPara xmlns:m="http://schemas.openxmlformats.org/officeDocument/2006/math">
                     <m:oMathParaPr>
@@ -15951,7 +17682,7 @@
             </p:txBody>
           </p:sp>
         </mc:Choice>
-        <mc:Fallback>
+        <mc:Fallback xmlns="">
           <p:sp>
             <p:nvSpPr>
               <p:cNvPr id="194" name="TextBox 193">
@@ -16040,8 +17771,8 @@
           </a:p>
         </p:txBody>
       </p:sp>
-      <mc:AlternateContent xmlns:mc="http://schemas.openxmlformats.org/markup-compatibility/2006">
-        <mc:Choice xmlns:a14="http://schemas.microsoft.com/office/drawing/2010/main" Requires="a14">
+      <mc:AlternateContent xmlns:mc="http://schemas.openxmlformats.org/markup-compatibility/2006" xmlns:a14="http://schemas.microsoft.com/office/drawing/2010/main">
+        <mc:Choice Requires="a14">
           <p:sp>
             <p:nvSpPr>
               <p:cNvPr id="196" name="TextBox 195">
@@ -16070,6 +17801,7 @@
               </a:bodyPr>
               <a:lstStyle/>
               <a:p>
+                <a:pPr/>
                 <a14:m>
                   <m:oMathPara xmlns:m="http://schemas.openxmlformats.org/officeDocument/2006/math">
                     <m:oMathParaPr>
@@ -16120,7 +17852,7 @@
             </p:txBody>
           </p:sp>
         </mc:Choice>
-        <mc:Fallback>
+        <mc:Fallback xmlns="">
           <p:sp>
             <p:nvSpPr>
               <p:cNvPr id="196" name="TextBox 195">
@@ -16165,8 +17897,8 @@
           </p:sp>
         </mc:Fallback>
       </mc:AlternateContent>
-      <mc:AlternateContent xmlns:mc="http://schemas.openxmlformats.org/markup-compatibility/2006">
-        <mc:Choice xmlns:a14="http://schemas.microsoft.com/office/drawing/2010/main" Requires="a14">
+      <mc:AlternateContent xmlns:mc="http://schemas.openxmlformats.org/markup-compatibility/2006" xmlns:a14="http://schemas.microsoft.com/office/drawing/2010/main">
+        <mc:Choice Requires="a14">
           <p:sp>
             <p:nvSpPr>
               <p:cNvPr id="197" name="TextBox 196">
@@ -16195,6 +17927,7 @@
               </a:bodyPr>
               <a:lstStyle/>
               <a:p>
+                <a:pPr/>
                 <a14:m>
                   <m:oMathPara xmlns:m="http://schemas.openxmlformats.org/officeDocument/2006/math">
                     <m:oMathParaPr>
@@ -16215,7 +17948,7 @@
             </p:txBody>
           </p:sp>
         </mc:Choice>
-        <mc:Fallback>
+        <mc:Fallback xmlns="">
           <p:sp>
             <p:nvSpPr>
               <p:cNvPr id="197" name="TextBox 196">
@@ -16260,8 +17993,8 @@
           </p:sp>
         </mc:Fallback>
       </mc:AlternateContent>
-      <mc:AlternateContent xmlns:mc="http://schemas.openxmlformats.org/markup-compatibility/2006">
-        <mc:Choice xmlns:a14="http://schemas.microsoft.com/office/drawing/2010/main" Requires="a14">
+      <mc:AlternateContent xmlns:mc="http://schemas.openxmlformats.org/markup-compatibility/2006" xmlns:a14="http://schemas.microsoft.com/office/drawing/2010/main">
+        <mc:Choice Requires="a14">
           <p:sp>
             <p:nvSpPr>
               <p:cNvPr id="198" name="TextBox 197">
@@ -16290,6 +18023,7 @@
               </a:bodyPr>
               <a:lstStyle/>
               <a:p>
+                <a:pPr/>
                 <a14:m>
                   <m:oMathPara xmlns:m="http://schemas.openxmlformats.org/officeDocument/2006/math">
                     <m:oMathParaPr>
@@ -16310,7 +18044,7 @@
             </p:txBody>
           </p:sp>
         </mc:Choice>
-        <mc:Fallback>
+        <mc:Fallback xmlns="">
           <p:sp>
             <p:nvSpPr>
               <p:cNvPr id="198" name="TextBox 197">
@@ -16435,8 +18169,8 @@
           </a:fontRef>
         </p:style>
       </p:cxnSp>
-      <mc:AlternateContent xmlns:mc="http://schemas.openxmlformats.org/markup-compatibility/2006">
-        <mc:Choice xmlns:a14="http://schemas.microsoft.com/office/drawing/2010/main" Requires="a14">
+      <mc:AlternateContent xmlns:mc="http://schemas.openxmlformats.org/markup-compatibility/2006" xmlns:a14="http://schemas.microsoft.com/office/drawing/2010/main">
+        <mc:Choice Requires="a14">
           <p:sp>
             <p:nvSpPr>
               <p:cNvPr id="202" name="TextBox 201">
@@ -16767,7 +18501,7 @@
             </p:txBody>
           </p:sp>
         </mc:Choice>
-        <mc:Fallback>
+        <mc:Fallback xmlns="">
           <p:sp>
             <p:nvSpPr>
               <p:cNvPr id="202" name="TextBox 201">
@@ -22973,8 +24707,8 @@
           </p:sp>
         </mc:Fallback>
       </mc:AlternateContent>
-      <mc:AlternateContent xmlns:mc="http://schemas.openxmlformats.org/markup-compatibility/2006">
-        <mc:Choice xmlns:a14="http://schemas.microsoft.com/office/drawing/2010/main" Requires="a14">
+      <mc:AlternateContent xmlns:mc="http://schemas.openxmlformats.org/markup-compatibility/2006" xmlns:a14="http://schemas.microsoft.com/office/drawing/2010/main">
+        <mc:Choice Requires="a14">
           <p:sp>
             <p:nvSpPr>
               <p:cNvPr id="15" name="Speech Bubble: Rectangle with Corners Rounded 14">
@@ -23091,7 +24825,7 @@
             </p:txBody>
           </p:sp>
         </mc:Choice>
-        <mc:Fallback>
+        <mc:Fallback xmlns="">
           <p:sp>
             <p:nvSpPr>
               <p:cNvPr id="15" name="Speech Bubble: Rectangle with Corners Rounded 14">
@@ -25953,8 +27687,8 @@
           </a:p>
         </p:txBody>
       </p:sp>
-      <mc:AlternateContent xmlns:mc="http://schemas.openxmlformats.org/markup-compatibility/2006">
-        <mc:Choice xmlns:a14="http://schemas.microsoft.com/office/drawing/2010/main" Requires="a14">
+      <mc:AlternateContent xmlns:mc="http://schemas.openxmlformats.org/markup-compatibility/2006" xmlns:a14="http://schemas.microsoft.com/office/drawing/2010/main">
+        <mc:Choice Requires="a14">
           <p:sp>
             <p:nvSpPr>
               <p:cNvPr id="3" name="Content Placeholder 2">
@@ -26426,7 +28160,7 @@
             </p:txBody>
           </p:sp>
         </mc:Choice>
-        <mc:Fallback>
+        <mc:Fallback xmlns="">
           <p:sp>
             <p:nvSpPr>
               <p:cNvPr id="3" name="Content Placeholder 2">

</xml_diff>